<commit_message>
omop & meditech slides
https://github.com/OuhscBbmc/prairie-outpost/issues/488
</commit_message>
<xml_diff>
--- a/publications/presentation-2020-12-ou-health/crdw-2020-12.pptx
+++ b/publications/presentation-2020-12-ou-health/crdw-2020-12.pptx
@@ -5,7 +5,7 @@
     <p:sldMasterId id="2147483648" r:id="rId1"/>
   </p:sldMasterIdLst>
   <p:notesMasterIdLst>
-    <p:notesMasterId r:id="rId17"/>
+    <p:notesMasterId r:id="rId18"/>
   </p:notesMasterIdLst>
   <p:sldIdLst>
     <p:sldId id="292" r:id="rId2"/>
@@ -18,11 +18,12 @@
     <p:sldId id="389" r:id="rId9"/>
     <p:sldId id="276" r:id="rId10"/>
     <p:sldId id="391" r:id="rId11"/>
-    <p:sldId id="340" r:id="rId12"/>
-    <p:sldId id="388" r:id="rId13"/>
-    <p:sldId id="390" r:id="rId14"/>
-    <p:sldId id="367" r:id="rId15"/>
-    <p:sldId id="296" r:id="rId16"/>
+    <p:sldId id="388" r:id="rId12"/>
+    <p:sldId id="392" r:id="rId13"/>
+    <p:sldId id="340" r:id="rId14"/>
+    <p:sldId id="390" r:id="rId15"/>
+    <p:sldId id="367" r:id="rId16"/>
+    <p:sldId id="296" r:id="rId17"/>
   </p:sldIdLst>
   <p:sldSz cx="12192000" cy="6858000"/>
   <p:notesSz cx="6858000" cy="9144000"/>
@@ -223,7 +224,7 @@
           <a:p>
             <a:fld id="{074B6824-7023-4228-BB04-DF38B9F7BAD4}" type="datetimeFigureOut">
               <a:rPr lang="en-US" smtClean="0"/>
-              <a:t>12/15/2020</a:t>
+              <a:t>12/16/2020</a:t>
             </a:fld>
             <a:endParaRPr lang="en-US"/>
           </a:p>
@@ -537,20 +538,41 @@
           <a:p>
             <a:r>
               <a:rPr lang="en-US" dirty="0" smtClean="0"/>
-              <a:t>Hi I’m Will, and part of the Clinical Data Warehouse effort on</a:t>
+              <a:t>Hi I’m Will, and part of the Clinical </a:t>
+            </a:r>
+            <a:r>
+              <a:rPr lang="en-US" dirty="0" smtClean="0"/>
+              <a:t>Research Data </a:t>
+            </a:r>
+            <a:r>
+              <a:rPr lang="en-US" dirty="0" smtClean="0"/>
+              <a:t>Warehouse effort on</a:t>
             </a:r>
             <a:r>
               <a:rPr lang="en-US" baseline="0" dirty="0" smtClean="0"/>
-              <a:t> campus.  I started as a conventional statistician and researcher, and based on experience with integrating our investigations with state agency data , our group moved into the world of EMRs and CDWs.</a:t>
-            </a:r>
-          </a:p>
-          <a:p>
+              <a:t> campus.  I started as a conventional statistician and researcher, and based on experience with integrating our investigations with state agency data , our group moved into the world of EMRs and </a:t>
+            </a:r>
+            <a:r>
+              <a:rPr lang="en-US" baseline="0" dirty="0" smtClean="0"/>
+              <a:t>warehouses.</a:t>
+            </a:r>
             <a:endParaRPr lang="en-US" baseline="0" dirty="0" smtClean="0"/>
           </a:p>
           <a:p>
+            <a:endParaRPr lang="en-US" baseline="0" dirty="0" smtClean="0"/>
+          </a:p>
+          <a:p>
             <a:r>
               <a:rPr lang="en-US" baseline="0" dirty="0" smtClean="0"/>
-              <a:t>I think these experiences have allowed our group to relate well with current PIs, as well as build a CDW ecosystem that works well with research.</a:t>
+              <a:t>I think these experiences have allowed our group to relate well with current PIs, as well as build a </a:t>
+            </a:r>
+            <a:r>
+              <a:rPr lang="en-US" baseline="0" dirty="0" smtClean="0"/>
+              <a:t>CRDW </a:t>
+            </a:r>
+            <a:r>
+              <a:rPr lang="en-US" baseline="0" dirty="0" smtClean="0"/>
+              <a:t>ecosystem that works well with research.</a:t>
             </a:r>
             <a:endParaRPr lang="en-US" dirty="0"/>
           </a:p>
@@ -1095,7 +1117,15 @@
             </a:r>
             <a:r>
               <a:rPr lang="en-US" baseline="0" dirty="0" smtClean="0"/>
-              <a:t> up in less than a day.  Some, like POPS, have been ongoing for 1.5 years.</a:t>
+              <a:t> up in less than a day.  Some, like POPS, have been ongoing for </a:t>
+            </a:r>
+            <a:r>
+              <a:rPr lang="en-US" baseline="0" dirty="0" smtClean="0"/>
+              <a:t>2 </a:t>
+            </a:r>
+            <a:r>
+              <a:rPr lang="en-US" baseline="0" dirty="0" smtClean="0"/>
+              <a:t>years.</a:t>
             </a:r>
             <a:endParaRPr lang="en-US" dirty="0"/>
           </a:p>
@@ -1384,7 +1414,7 @@
           <a:p>
             <a:fld id="{372B4D55-8C27-4C2C-B1CD-E79AEC43B316}" type="slidenum">
               <a:rPr lang="en-US" smtClean="0"/>
-              <a:t>11</a:t>
+              <a:t>13</a:t>
             </a:fld>
             <a:endParaRPr lang="en-US"/>
           </a:p>
@@ -1473,7 +1503,7 @@
                 </a:solidFill>
               </a:rPr>
               <a:pPr/>
-              <a:t>14</a:t>
+              <a:t>15</a:t>
             </a:fld>
             <a:endParaRPr lang="en-US">
               <a:solidFill>
@@ -1627,7 +1657,7 @@
           <a:p>
             <a:fld id="{48D8CAB9-F02B-405D-B26E-A393DAA55285}" type="datetimeFigureOut">
               <a:rPr lang="en-US" smtClean="0"/>
-              <a:t>12/15/2020</a:t>
+              <a:t>12/16/2020</a:t>
             </a:fld>
             <a:endParaRPr lang="en-US"/>
           </a:p>
@@ -1821,7 +1851,7 @@
           <a:p>
             <a:fld id="{48D8CAB9-F02B-405D-B26E-A393DAA55285}" type="datetimeFigureOut">
               <a:rPr lang="en-US" smtClean="0"/>
-              <a:t>12/15/2020</a:t>
+              <a:t>12/16/2020</a:t>
             </a:fld>
             <a:endParaRPr lang="en-US"/>
           </a:p>
@@ -2001,7 +2031,7 @@
           <a:p>
             <a:fld id="{48D8CAB9-F02B-405D-B26E-A393DAA55285}" type="datetimeFigureOut">
               <a:rPr lang="en-US" smtClean="0"/>
-              <a:t>12/15/2020</a:t>
+              <a:t>12/16/2020</a:t>
             </a:fld>
             <a:endParaRPr lang="en-US"/>
           </a:p>
@@ -2171,7 +2201,7 @@
           <a:p>
             <a:fld id="{48D8CAB9-F02B-405D-B26E-A393DAA55285}" type="datetimeFigureOut">
               <a:rPr lang="en-US" smtClean="0"/>
-              <a:t>12/15/2020</a:t>
+              <a:t>12/16/2020</a:t>
             </a:fld>
             <a:endParaRPr lang="en-US"/>
           </a:p>
@@ -2417,7 +2447,7 @@
           <a:p>
             <a:fld id="{48D8CAB9-F02B-405D-B26E-A393DAA55285}" type="datetimeFigureOut">
               <a:rPr lang="en-US" smtClean="0"/>
-              <a:t>12/15/2020</a:t>
+              <a:t>12/16/2020</a:t>
             </a:fld>
             <a:endParaRPr lang="en-US"/>
           </a:p>
@@ -2649,7 +2679,7 @@
           <a:p>
             <a:fld id="{48D8CAB9-F02B-405D-B26E-A393DAA55285}" type="datetimeFigureOut">
               <a:rPr lang="en-US" smtClean="0"/>
-              <a:t>12/15/2020</a:t>
+              <a:t>12/16/2020</a:t>
             </a:fld>
             <a:endParaRPr lang="en-US"/>
           </a:p>
@@ -3016,7 +3046,7 @@
           <a:p>
             <a:fld id="{48D8CAB9-F02B-405D-B26E-A393DAA55285}" type="datetimeFigureOut">
               <a:rPr lang="en-US" smtClean="0"/>
-              <a:t>12/15/2020</a:t>
+              <a:t>12/16/2020</a:t>
             </a:fld>
             <a:endParaRPr lang="en-US"/>
           </a:p>
@@ -3134,7 +3164,7 @@
           <a:p>
             <a:fld id="{48D8CAB9-F02B-405D-B26E-A393DAA55285}" type="datetimeFigureOut">
               <a:rPr lang="en-US" smtClean="0"/>
-              <a:t>12/15/2020</a:t>
+              <a:t>12/16/2020</a:t>
             </a:fld>
             <a:endParaRPr lang="en-US"/>
           </a:p>
@@ -3229,7 +3259,7 @@
           <a:p>
             <a:fld id="{48D8CAB9-F02B-405D-B26E-A393DAA55285}" type="datetimeFigureOut">
               <a:rPr lang="en-US" smtClean="0"/>
-              <a:t>12/15/2020</a:t>
+              <a:t>12/16/2020</a:t>
             </a:fld>
             <a:endParaRPr lang="en-US"/>
           </a:p>
@@ -3506,7 +3536,7 @@
           <a:p>
             <a:fld id="{48D8CAB9-F02B-405D-B26E-A393DAA55285}" type="datetimeFigureOut">
               <a:rPr lang="en-US" smtClean="0"/>
-              <a:t>12/15/2020</a:t>
+              <a:t>12/16/2020</a:t>
             </a:fld>
             <a:endParaRPr lang="en-US"/>
           </a:p>
@@ -3759,7 +3789,7 @@
           <a:p>
             <a:fld id="{48D8CAB9-F02B-405D-B26E-A393DAA55285}" type="datetimeFigureOut">
               <a:rPr lang="en-US" smtClean="0"/>
-              <a:t>12/15/2020</a:t>
+              <a:t>12/16/2020</a:t>
             </a:fld>
             <a:endParaRPr lang="en-US"/>
           </a:p>
@@ -3972,7 +4002,7 @@
           <a:p>
             <a:fld id="{48D8CAB9-F02B-405D-B26E-A393DAA55285}" type="datetimeFigureOut">
               <a:rPr lang="en-US" smtClean="0"/>
-              <a:t>12/15/2020</a:t>
+              <a:t>12/16/2020</a:t>
             </a:fld>
             <a:endParaRPr lang="en-US"/>
           </a:p>
@@ -4420,23 +4450,7 @@
                   <a:srgbClr val="0070C0"/>
                 </a:solidFill>
               </a:rPr>
-              <a:t>Clinical </a:t>
-            </a:r>
-            <a:r>
-              <a:rPr lang="en-US" sz="4800" dirty="0" smtClean="0">
-                <a:solidFill>
-                  <a:srgbClr val="0070C0"/>
-                </a:solidFill>
-              </a:rPr>
-              <a:t>Research Data </a:t>
-            </a:r>
-            <a:r>
-              <a:rPr lang="en-US" sz="4800" dirty="0" smtClean="0">
-                <a:solidFill>
-                  <a:srgbClr val="0070C0"/>
-                </a:solidFill>
-              </a:rPr>
-              <a:t>Warehouse</a:t>
+              <a:t>Clinical Research Data Warehouse</a:t>
             </a:r>
             <a:br>
               <a:rPr lang="en-US" sz="4800" dirty="0" smtClean="0">
@@ -4877,25 +4891,6 @@
       </p:grpSpPr>
       <p:sp>
         <p:nvSpPr>
-          <p:cNvPr id="2" name="Title 1"/>
-          <p:cNvSpPr>
-            <a:spLocks noGrp="1"/>
-          </p:cNvSpPr>
-          <p:nvPr>
-            <p:ph type="title"/>
-          </p:nvPr>
-        </p:nvSpPr>
-        <p:spPr/>
-        <p:txBody>
-          <a:bodyPr/>
-          <a:lstStyle/>
-          <a:p>
-            <a:endParaRPr lang="en-US"/>
-          </a:p>
-        </p:txBody>
-      </p:sp>
-      <p:sp>
-        <p:nvSpPr>
           <p:cNvPr id="3" name="Content Placeholder 2"/>
           <p:cNvSpPr>
             <a:spLocks noGrp="1"/>
@@ -4904,46 +4899,253 @@
             <p:ph idx="1"/>
           </p:nvPr>
         </p:nvSpPr>
-        <p:spPr/>
+        <p:spPr>
+          <a:xfrm>
+            <a:off x="298383" y="882994"/>
+            <a:ext cx="11704320" cy="5795124"/>
+          </a:xfrm>
+        </p:spPr>
         <p:txBody>
-          <a:bodyPr/>
+          <a:bodyPr>
+            <a:normAutofit/>
+          </a:bodyPr>
           <a:lstStyle/>
           <a:p>
             <a:r>
               <a:rPr lang="en-US" dirty="0" smtClean="0"/>
-              <a:t>We reviewed the last two years of our requests and built a superset .</a:t>
-            </a:r>
-          </a:p>
-          <a:p>
+              <a:t>Working closely </a:t>
+            </a:r>
             <a:r>
               <a:rPr lang="en-US" dirty="0" smtClean="0"/>
-              <a:t>We’ve started to use it for 3 projects, in order to identify additional features we need</a:t>
-            </a:r>
-          </a:p>
-          <a:p>
+              <a:t>with Jimmie Hackworth (in Allen Smith’s group).</a:t>
+            </a:r>
+            <a:endParaRPr lang="en-US" dirty="0"/>
+          </a:p>
+          <a:p>
+            <a:pPr lvl="1"/>
             <a:r>
               <a:rPr lang="en-US" dirty="0" smtClean="0"/>
-              <a:t>Text files are saved to OUM’s ftp server.  We download, ingest, and groom them every morning.</a:t>
+              <a:t>He’s awesome –knowledge, skill, and patience. He anticipates &amp; avoids many problems.</a:t>
             </a:r>
           </a:p>
           <a:p>
             <a:r>
               <a:rPr lang="en-US" dirty="0" smtClean="0"/>
-              <a:t>List of tables: </a:t>
-            </a:r>
-          </a:p>
-          <a:p>
+              <a:t>Reviewed </a:t>
+            </a:r>
             <a:r>
               <a:rPr lang="en-US" dirty="0" smtClean="0"/>
-              <a:t>Jimmie is awesome</a:t>
-            </a:r>
-          </a:p>
-          <a:p>
+              <a:t>the last two years of </a:t>
+            </a:r>
             <a:r>
               <a:rPr lang="en-US" dirty="0" smtClean="0"/>
-              <a:t>Role in the future Data Lake</a:t>
+              <a:t>CRDW requests </a:t>
+            </a:r>
+            <a:r>
+              <a:rPr lang="en-US" dirty="0" smtClean="0"/>
+              <a:t>and built a superset </a:t>
+            </a:r>
+            <a:r>
+              <a:rPr lang="en-US" dirty="0" smtClean="0"/>
+              <a:t>covering:</a:t>
+            </a:r>
+          </a:p>
+          <a:p>
+            <a:pPr lvl="1"/>
+            <a:r>
+              <a:rPr lang="en-US" dirty="0" smtClean="0"/>
+              <a:t>Variables</a:t>
+            </a:r>
+          </a:p>
+          <a:p>
+            <a:pPr lvl="1"/>
+            <a:r>
+              <a:rPr lang="en-US" dirty="0" smtClean="0"/>
+              <a:t>Transition</a:t>
+            </a:r>
+            <a:r>
+              <a:rPr lang="en-US" dirty="0"/>
+              <a:t> </a:t>
+            </a:r>
+            <a:r>
+              <a:rPr lang="en-US" dirty="0" smtClean="0"/>
+              <a:t>&amp; Events within an Admission</a:t>
+            </a:r>
+            <a:endParaRPr lang="en-US" dirty="0" smtClean="0"/>
+          </a:p>
+          <a:p>
+            <a:r>
+              <a:rPr lang="en-US" dirty="0" smtClean="0"/>
+              <a:t>We’ve started </a:t>
+            </a:r>
+            <a:r>
+              <a:rPr lang="en-US" dirty="0" smtClean="0"/>
+              <a:t>using </a:t>
+            </a:r>
+            <a:r>
+              <a:rPr lang="en-US" dirty="0" smtClean="0"/>
+              <a:t>it </a:t>
+            </a:r>
+            <a:r>
+              <a:rPr lang="en-US" dirty="0" smtClean="0"/>
+              <a:t>for 3 projects –to identify </a:t>
+            </a:r>
+            <a:r>
+              <a:rPr lang="en-US" dirty="0" smtClean="0"/>
+              <a:t>additional features we need</a:t>
+            </a:r>
+          </a:p>
+          <a:p>
+            <a:r>
+              <a:rPr lang="en-US" dirty="0" smtClean="0"/>
+              <a:t>Morning routine</a:t>
+            </a:r>
+          </a:p>
+          <a:p>
+            <a:pPr lvl="1"/>
+            <a:r>
+              <a:rPr lang="en-US" dirty="0" smtClean="0"/>
+              <a:t>Text </a:t>
+            </a:r>
+            <a:r>
+              <a:rPr lang="en-US" dirty="0" smtClean="0"/>
+              <a:t>files are saved to OUM’s ftp </a:t>
+            </a:r>
+            <a:r>
+              <a:rPr lang="en-US" dirty="0" smtClean="0"/>
+              <a:t>server by Jimmie &amp; Richie around 1am.</a:t>
+            </a:r>
+          </a:p>
+          <a:p>
+            <a:pPr lvl="1"/>
+            <a:r>
+              <a:rPr lang="en-US" dirty="0" smtClean="0"/>
+              <a:t>CRDW downloads</a:t>
+            </a:r>
+            <a:r>
+              <a:rPr lang="en-US" dirty="0"/>
+              <a:t>, grooms, &amp; </a:t>
+            </a:r>
+            <a:r>
+              <a:rPr lang="en-US" dirty="0" smtClean="0"/>
+              <a:t>ingests </a:t>
+            </a:r>
+            <a:r>
+              <a:rPr lang="en-US" dirty="0" smtClean="0"/>
+              <a:t>them into the .</a:t>
+            </a:r>
+            <a:endParaRPr lang="en-US" dirty="0" smtClean="0"/>
+          </a:p>
+          <a:p>
+            <a:r>
+              <a:rPr lang="en-US" dirty="0" smtClean="0"/>
+              <a:t>Eventual tables</a:t>
+            </a:r>
+            <a:r>
+              <a:rPr lang="en-US" dirty="0" smtClean="0"/>
+              <a:t>: </a:t>
+            </a:r>
+            <a:r>
+              <a:rPr lang="en-US" dirty="0"/>
+              <a:t>patient, admission, </a:t>
+            </a:r>
+            <a:r>
+              <a:rPr lang="en-US" dirty="0" smtClean="0"/>
+              <a:t>admission-event, dx, med, labs, operation, procedure, blood-product, </a:t>
+            </a:r>
+            <a:r>
+              <a:rPr lang="en-US" dirty="0" err="1" smtClean="0"/>
+              <a:t>obs</a:t>
+            </a:r>
+            <a:r>
+              <a:rPr lang="en-US" dirty="0" smtClean="0"/>
+              <a:t>-nurse, &amp; dictionaries.</a:t>
+            </a:r>
+            <a:endParaRPr lang="en-US" dirty="0" smtClean="0"/>
+          </a:p>
+          <a:p>
+            <a:r>
+              <a:rPr lang="en-US" dirty="0" smtClean="0"/>
+              <a:t>Role </a:t>
+            </a:r>
+            <a:r>
+              <a:rPr lang="en-US" dirty="0" smtClean="0"/>
+              <a:t>in the future Data Lake</a:t>
             </a:r>
             <a:endParaRPr lang="en-US" dirty="0"/>
+          </a:p>
+        </p:txBody>
+      </p:sp>
+      <p:sp>
+        <p:nvSpPr>
+          <p:cNvPr id="4" name="Title 1"/>
+          <p:cNvSpPr txBox="1">
+            <a:spLocks/>
+          </p:cNvSpPr>
+          <p:nvPr/>
+        </p:nvSpPr>
+        <p:spPr>
+          <a:xfrm>
+            <a:off x="781050" y="78400"/>
+            <a:ext cx="10515600" cy="804594"/>
+          </a:xfrm>
+          <a:prstGeom prst="rect">
+            <a:avLst/>
+          </a:prstGeom>
+        </p:spPr>
+        <p:txBody>
+          <a:bodyPr vert="horz" lIns="91440" tIns="45720" rIns="91440" bIns="45720" rtlCol="0" anchor="ctr">
+            <a:normAutofit/>
+          </a:bodyPr>
+          <a:lstStyle>
+            <a:lvl1pPr algn="l" defTabSz="914400" rtl="0" eaLnBrk="1" latinLnBrk="0" hangingPunct="1">
+              <a:lnSpc>
+                <a:spcPct val="90000"/>
+              </a:lnSpc>
+              <a:spcBef>
+                <a:spcPct val="0"/>
+              </a:spcBef>
+              <a:buNone/>
+              <a:defRPr sz="4400" kern="1200">
+                <a:solidFill>
+                  <a:schemeClr val="tx1"/>
+                </a:solidFill>
+                <a:latin typeface="+mj-lt"/>
+                <a:ea typeface="+mj-ea"/>
+                <a:cs typeface="+mj-cs"/>
+              </a:defRPr>
+            </a:lvl1pPr>
+          </a:lstStyle>
+          <a:p>
+            <a:r>
+              <a:rPr lang="en-US" sz="3600" b="1" i="1" dirty="0" smtClean="0">
+                <a:solidFill>
+                  <a:srgbClr val="0070C0"/>
+                </a:solidFill>
+              </a:rPr>
+              <a:t>Meditech </a:t>
+            </a:r>
+            <a:r>
+              <a:rPr lang="en-US" sz="3600" b="1" i="1" dirty="0" smtClean="0">
+                <a:solidFill>
+                  <a:srgbClr val="0070C0"/>
+                </a:solidFill>
+              </a:rPr>
+              <a:t>in the </a:t>
+            </a:r>
+            <a:r>
+              <a:rPr lang="en-US" sz="3600" b="1" i="1" dirty="0" smtClean="0">
+                <a:solidFill>
+                  <a:srgbClr val="0070C0"/>
+                </a:solidFill>
+              </a:rPr>
+              <a:t>CRDW</a:t>
+            </a:r>
+            <a:endParaRPr lang="en-US" sz="3600" b="1" i="1" dirty="0">
+              <a:solidFill>
+                <a:srgbClr val="0070C0"/>
+              </a:solidFill>
+            </a:endParaRPr>
           </a:p>
         </p:txBody>
       </p:sp>
@@ -4996,8 +5198,8 @@
         </p:nvSpPr>
         <p:spPr>
           <a:xfrm>
-            <a:off x="776452" y="19985"/>
-            <a:ext cx="10515600" cy="640416"/>
+            <a:off x="299185" y="25934"/>
+            <a:ext cx="10515600" cy="806214"/>
           </a:xfrm>
         </p:spPr>
         <p:txBody>
@@ -5007,13 +5209,18 @@
           <a:lstStyle/>
           <a:p>
             <a:r>
-              <a:rPr lang="en-US" sz="3600" b="1" i="1" dirty="0">
+              <a:rPr lang="en-US" sz="3600" b="1" i="1" dirty="0" smtClean="0">
                 <a:solidFill>
                   <a:srgbClr val="0070C0"/>
                 </a:solidFill>
               </a:rPr>
-              <a:t>IRB and Privacy Review Guidance</a:t>
-            </a:r>
+              <a:t>National Registry Projects</a:t>
+            </a:r>
+            <a:endParaRPr lang="en-US" sz="3600" b="1" i="1" dirty="0">
+              <a:solidFill>
+                <a:srgbClr val="0070C0"/>
+              </a:solidFill>
+            </a:endParaRPr>
           </a:p>
         </p:txBody>
       </p:sp>
@@ -5029,104 +5236,173 @@
         </p:nvSpPr>
         <p:spPr>
           <a:xfrm>
-            <a:off x="88900" y="660402"/>
-            <a:ext cx="12103099" cy="6197598"/>
+            <a:off x="9627" y="750772"/>
+            <a:ext cx="11935325" cy="5986912"/>
           </a:xfrm>
         </p:spPr>
         <p:txBody>
           <a:bodyPr>
-            <a:noAutofit/>
+            <a:normAutofit fontScale="92500" lnSpcReduction="20000"/>
           </a:bodyPr>
           <a:lstStyle/>
           <a:p>
-            <a:r>
-              <a:rPr lang="en-US" sz="2400" dirty="0" smtClean="0"/>
-              <a:t>Requests that are preparatory to research </a:t>
-            </a:r>
-            <a:r>
-              <a:rPr lang="en-US" sz="2400" dirty="0"/>
-              <a:t>must be submitted to the IRB/University Privacy </a:t>
-            </a:r>
-            <a:r>
-              <a:rPr lang="en-US" sz="2400" dirty="0" smtClean="0"/>
-              <a:t>Board for review and approval.</a:t>
-            </a:r>
-          </a:p>
-          <a:p>
-            <a:endParaRPr lang="en-US" sz="2400" dirty="0" smtClean="0"/>
-          </a:p>
-          <a:p>
-            <a:r>
-              <a:rPr lang="en-US" sz="2400" dirty="0" smtClean="0"/>
-              <a:t>Program Evaluation, CQI, &amp; Feasibility Assessments:</a:t>
-            </a:r>
-          </a:p>
-          <a:p>
-            <a:pPr lvl="1"/>
-            <a:r>
-              <a:rPr lang="en-US" sz="2000" dirty="0" smtClean="0"/>
-              <a:t>If PHI is </a:t>
-            </a:r>
-            <a:r>
-              <a:rPr lang="en-US" sz="2000" b="1" u="sng" dirty="0" smtClean="0"/>
-              <a:t>NOT</a:t>
-            </a:r>
-            <a:r>
-              <a:rPr lang="en-US" sz="2000" dirty="0" smtClean="0"/>
-              <a:t> included, it is generally not considered human subjects research.</a:t>
-            </a:r>
-          </a:p>
-          <a:p>
-            <a:pPr lvl="1"/>
-            <a:r>
-              <a:rPr lang="en-US" sz="2000" dirty="0" smtClean="0"/>
-              <a:t>A determination of human subjects research (DHSR) may be submitted to the IRB.</a:t>
-            </a:r>
-          </a:p>
-          <a:p>
-            <a:pPr lvl="1"/>
-            <a:r>
-              <a:rPr lang="en-US" sz="2000" dirty="0" smtClean="0"/>
-              <a:t>Aggregate data may be provided without an IRB submission.</a:t>
-            </a:r>
-          </a:p>
-          <a:p>
-            <a:endParaRPr lang="en-US" sz="2400" dirty="0" smtClean="0"/>
-          </a:p>
-          <a:p>
-            <a:r>
-              <a:rPr lang="en-US" sz="2400" dirty="0" smtClean="0">
+            <a:pPr marL="0" indent="0">
+              <a:buNone/>
+            </a:pPr>
+            <a:r>
+              <a:rPr lang="en-US" dirty="0">
+                <a:latin typeface="+mj-lt"/>
+              </a:rPr>
+              <a:t>ORIEN </a:t>
+            </a:r>
+            <a:r>
+              <a:rPr lang="en-US" dirty="0" smtClean="0">
+                <a:latin typeface="+mj-lt"/>
+              </a:rPr>
+              <a:t>(</a:t>
+            </a:r>
+            <a:r>
+              <a:rPr lang="en-US" dirty="0" smtClean="0">
+                <a:latin typeface="+mj-lt"/>
+                <a:ea typeface="+mj-ea"/>
+                <a:cs typeface="+mj-cs"/>
+              </a:rPr>
+              <a:t>Oncology Research Information Exchange Network) -</a:t>
+            </a:r>
+            <a:r>
+              <a:rPr lang="en-US" sz="2000" dirty="0" smtClean="0">
+                <a:latin typeface="+mj-lt"/>
+                <a:ea typeface="+mj-ea"/>
+                <a:cs typeface="+mj-cs"/>
+              </a:rPr>
+              <a:t>Stephenson Cancer Center</a:t>
+            </a:r>
+            <a:endParaRPr lang="en-US" dirty="0" smtClean="0">
+              <a:latin typeface="+mj-lt"/>
+              <a:ea typeface="+mj-ea"/>
+              <a:cs typeface="+mj-cs"/>
+            </a:endParaRPr>
+          </a:p>
+          <a:p>
+            <a:r>
+              <a:rPr lang="en-US" sz="2000" dirty="0" smtClean="0">
                 <a:solidFill>
                   <a:schemeClr val="bg1">
                     <a:lumMod val="50000"/>
                   </a:schemeClr>
                 </a:solidFill>
+                <a:ea typeface="+mj-ea"/>
+                <a:cs typeface="+mj-cs"/>
               </a:rPr>
-              <a:t>The following activities are </a:t>
-            </a:r>
-            <a:r>
-              <a:rPr lang="en-US" sz="2400" b="1" u="sng" dirty="0" smtClean="0">
+              <a:t>This is a study designed to create a centralized clinical data and tissue repository. Clinical data, to include demographics, medical history, cancer classification, medical treatment, pathology records, long-term outcomes, quality of life, general health, laboratory, pathology, radiographic data/images, and cause of death, will be collected on all enrolled patients from the time of initial entry into the study and continue as long as the study remains in progress.</a:t>
+            </a:r>
+          </a:p>
+          <a:p>
+            <a:r>
+              <a:rPr lang="en-US" sz="2000" dirty="0" smtClean="0">
                 <a:solidFill>
                   <a:schemeClr val="bg1">
                     <a:lumMod val="50000"/>
                   </a:schemeClr>
                 </a:solidFill>
+                <a:ea typeface="+mj-ea"/>
+                <a:cs typeface="+mj-cs"/>
               </a:rPr>
-              <a:t>NOT</a:t>
-            </a:r>
-            <a:r>
-              <a:rPr lang="en-US" sz="2400" dirty="0" smtClean="0">
+              <a:t>Given the scope, manual data abstraction proved to be very resource intensive. The CRDW team was consulted to explore the feasibility of extracting pathology records. </a:t>
+            </a:r>
+          </a:p>
+          <a:p>
+            <a:r>
+              <a:rPr lang="en-US" sz="2000" dirty="0" smtClean="0">
                 <a:solidFill>
                   <a:schemeClr val="bg1">
                     <a:lumMod val="50000"/>
                   </a:schemeClr>
                 </a:solidFill>
+                <a:ea typeface="+mj-ea"/>
+                <a:cs typeface="+mj-cs"/>
               </a:rPr>
-              <a:t> human subjects research:</a:t>
-            </a:r>
-          </a:p>
-          <a:p>
-            <a:pPr lvl="1"/>
+              <a:t>The data specifications required more than the pathology result value (e.g. reference range, critical value, etc.), which necessitated the use of ‘</a:t>
+            </a:r>
+            <a:r>
+              <a:rPr lang="en-US" sz="2000" dirty="0" err="1" smtClean="0">
+                <a:solidFill>
+                  <a:schemeClr val="bg1">
+                    <a:lumMod val="50000"/>
+                  </a:schemeClr>
+                </a:solidFill>
+                <a:ea typeface="+mj-ea"/>
+                <a:cs typeface="+mj-cs"/>
+              </a:rPr>
+              <a:t>docdata</a:t>
+            </a:r>
+            <a:r>
+              <a:rPr lang="en-US" sz="2000" dirty="0" smtClean="0">
+                <a:solidFill>
+                  <a:schemeClr val="bg1">
+                    <a:lumMod val="50000"/>
+                  </a:schemeClr>
+                </a:solidFill>
+                <a:ea typeface="+mj-ea"/>
+                <a:cs typeface="+mj-cs"/>
+              </a:rPr>
+              <a:t>’, regexes for text parsing,… </a:t>
+            </a:r>
+          </a:p>
+          <a:p>
+            <a:endParaRPr lang="en-US" sz="2600" b="1" i="1" dirty="0" smtClean="0">
+              <a:latin typeface="+mj-lt"/>
+              <a:ea typeface="+mj-ea"/>
+              <a:cs typeface="+mj-cs"/>
+            </a:endParaRPr>
+          </a:p>
+          <a:p>
+            <a:pPr marL="0" indent="0">
+              <a:buNone/>
+            </a:pPr>
+            <a:r>
+              <a:rPr lang="en-US" dirty="0" smtClean="0">
+                <a:latin typeface="+mj-lt"/>
+                <a:ea typeface="+mj-ea"/>
+                <a:cs typeface="+mj-cs"/>
+              </a:rPr>
+              <a:t>Oncologic Outcomes in Renal Cell Carcinoma</a:t>
+            </a:r>
+            <a:r>
+              <a:rPr lang="en-US" sz="2400" b="1" dirty="0" smtClean="0">
+                <a:latin typeface="+mj-lt"/>
+                <a:ea typeface="+mj-ea"/>
+                <a:cs typeface="+mj-cs"/>
+              </a:rPr>
+              <a:t> -</a:t>
+            </a:r>
+            <a:r>
+              <a:rPr lang="en-US" sz="2000" dirty="0" smtClean="0">
+                <a:latin typeface="+mj-lt"/>
+                <a:ea typeface="+mj-ea"/>
+                <a:cs typeface="+mj-cs"/>
+              </a:rPr>
+              <a:t>OUHSC Department of Urology</a:t>
+            </a:r>
+            <a:endParaRPr lang="en-US" sz="2400" dirty="0" smtClean="0">
+              <a:latin typeface="+mj-lt"/>
+              <a:ea typeface="+mj-ea"/>
+              <a:cs typeface="+mj-cs"/>
+            </a:endParaRPr>
+          </a:p>
+          <a:p>
+            <a:r>
+              <a:rPr lang="en-US" sz="2000" dirty="0" smtClean="0">
+                <a:solidFill>
+                  <a:schemeClr val="bg1">
+                    <a:lumMod val="50000"/>
+                  </a:schemeClr>
+                </a:solidFill>
+                <a:ea typeface="+mj-ea"/>
+                <a:cs typeface="+mj-cs"/>
+              </a:rPr>
+              <a:t>The </a:t>
+            </a:r>
             <a:r>
               <a:rPr lang="en-US" sz="2000" dirty="0">
                 <a:solidFill>
@@ -5134,9 +5410,22 @@
                     <a:lumMod val="50000"/>
                   </a:schemeClr>
                 </a:solidFill>
+                <a:ea typeface="+mj-ea"/>
+                <a:cs typeface="+mj-cs"/>
               </a:rPr>
-              <a:t>Classroom evaluation activities when assessment involves regular classroom activities and the results of the evaluation process are intended to be used for the sole purpose of enhancing teaching practices of the </a:t>
-            </a:r>
+              <a:t>primary objective of this study is to establish a kidney cancer registry to enable investigations of patients evaluated and treated for kidney cancer, with emphasis on efficacy of surgical technique, postoperative complication rates, response to immunotherapy, and utility of biomarkers/genomic tests. </a:t>
+            </a:r>
+            <a:endParaRPr lang="en-US" sz="2000" dirty="0" smtClean="0">
+              <a:solidFill>
+                <a:schemeClr val="bg1">
+                  <a:lumMod val="50000"/>
+                </a:schemeClr>
+              </a:solidFill>
+              <a:ea typeface="+mj-ea"/>
+              <a:cs typeface="+mj-cs"/>
+            </a:endParaRPr>
+          </a:p>
+          <a:p>
             <a:r>
               <a:rPr lang="en-US" sz="2000" dirty="0" smtClean="0">
                 <a:solidFill>
@@ -5144,8 +5433,34 @@
                     <a:lumMod val="50000"/>
                   </a:schemeClr>
                 </a:solidFill>
+                <a:ea typeface="+mj-ea"/>
+                <a:cs typeface="+mj-cs"/>
               </a:rPr>
-              <a:t>instructor</a:t>
+              <a:t>The CDW was asked to assemble a list of patients diagnosed with kidney cancer since 2010. The study team will retrospectively populate a </a:t>
+            </a:r>
+            <a:r>
+              <a:rPr lang="en-US" sz="2000" dirty="0" err="1" smtClean="0">
+                <a:solidFill>
+                  <a:schemeClr val="bg1">
+                    <a:lumMod val="50000"/>
+                  </a:schemeClr>
+                </a:solidFill>
+                <a:ea typeface="+mj-ea"/>
+                <a:cs typeface="+mj-cs"/>
+              </a:rPr>
+              <a:t>REDCap</a:t>
+            </a:r>
+            <a:r>
+              <a:rPr lang="en-US" sz="2000" dirty="0" smtClean="0">
+                <a:solidFill>
+                  <a:schemeClr val="bg1">
+                    <a:lumMod val="50000"/>
+                  </a:schemeClr>
+                </a:solidFill>
+                <a:ea typeface="+mj-ea"/>
+                <a:cs typeface="+mj-cs"/>
+              </a:rPr>
+              <a:t> project with the desired clinical data for this cohort as well as prospectively enroll current and future patients.</a:t>
             </a:r>
             <a:endParaRPr lang="en-US" sz="2000" dirty="0">
               <a:solidFill>
@@ -5153,96 +5468,62 @@
                   <a:lumMod val="50000"/>
                 </a:schemeClr>
               </a:solidFill>
+              <a:ea typeface="+mj-ea"/>
+              <a:cs typeface="+mj-cs"/>
             </a:endParaRPr>
           </a:p>
           <a:p>
             <a:pPr lvl="1"/>
+            <a:endParaRPr lang="en-US" sz="2200" b="1" i="1" dirty="0" smtClean="0">
+              <a:latin typeface="+mj-lt"/>
+              <a:ea typeface="+mj-ea"/>
+              <a:cs typeface="+mj-cs"/>
+            </a:endParaRPr>
+          </a:p>
+          <a:p>
+            <a:pPr marL="0" indent="0">
+              <a:buNone/>
+            </a:pPr>
+            <a:r>
+              <a:rPr lang="en-US" dirty="0">
+                <a:latin typeface="+mj-lt"/>
+              </a:rPr>
+              <a:t>N3C (National COVID Cohort Collaborative</a:t>
+            </a:r>
+            <a:r>
+              <a:rPr lang="en-US" dirty="0" smtClean="0">
+                <a:latin typeface="+mj-lt"/>
+              </a:rPr>
+              <a:t>)</a:t>
+            </a:r>
+            <a:r>
+              <a:rPr lang="en-US" dirty="0">
+                <a:latin typeface="+mj-lt"/>
+              </a:rPr>
+              <a:t> </a:t>
+            </a:r>
+            <a:r>
+              <a:rPr lang="en-US" sz="2400" b="1" dirty="0" smtClean="0">
+                <a:latin typeface="+mj-lt"/>
+              </a:rPr>
+              <a:t>-</a:t>
+            </a:r>
             <a:r>
               <a:rPr lang="en-US" sz="2000" dirty="0">
-                <a:solidFill>
-                  <a:schemeClr val="bg1">
-                    <a:lumMod val="50000"/>
-                  </a:schemeClr>
-                </a:solidFill>
+                <a:latin typeface="+mj-lt"/>
               </a:rPr>
-              <a:t>Quality improvement activities designed to enhance functionality of a department or campus program provided that results are not intended to be shared outside of the </a:t>
-            </a:r>
-            <a:r>
-              <a:rPr lang="en-US" sz="2000" dirty="0" smtClean="0">
-                <a:solidFill>
-                  <a:schemeClr val="bg1">
-                    <a:lumMod val="50000"/>
-                  </a:schemeClr>
-                </a:solidFill>
-              </a:rPr>
-              <a:t>University</a:t>
-            </a:r>
-            <a:endParaRPr lang="en-US" sz="2000" dirty="0">
-              <a:solidFill>
-                <a:schemeClr val="bg1">
-                  <a:lumMod val="50000"/>
-                </a:schemeClr>
-              </a:solidFill>
+              <a:t>OUHSC </a:t>
+            </a:r>
+            <a:endParaRPr lang="en-US" dirty="0">
+              <a:latin typeface="+mj-lt"/>
             </a:endParaRPr>
           </a:p>
           <a:p>
             <a:pPr lvl="1"/>
-            <a:r>
-              <a:rPr lang="en-US" sz="2000" dirty="0">
-                <a:solidFill>
-                  <a:schemeClr val="bg1">
-                    <a:lumMod val="50000"/>
-                  </a:schemeClr>
-                </a:solidFill>
-              </a:rPr>
-              <a:t>Program </a:t>
-            </a:r>
-            <a:r>
-              <a:rPr lang="en-US" sz="2000" dirty="0" smtClean="0">
-                <a:solidFill>
-                  <a:schemeClr val="bg1">
-                    <a:lumMod val="50000"/>
-                  </a:schemeClr>
-                </a:solidFill>
-              </a:rPr>
-              <a:t>evaluations</a:t>
-            </a:r>
-            <a:endParaRPr lang="en-US" sz="2000" dirty="0">
-              <a:solidFill>
-                <a:schemeClr val="bg1">
-                  <a:lumMod val="50000"/>
-                </a:schemeClr>
-              </a:solidFill>
-            </a:endParaRPr>
-          </a:p>
-          <a:p>
-            <a:pPr lvl="1"/>
-            <a:r>
-              <a:rPr lang="en-US" sz="2000" dirty="0">
-                <a:solidFill>
-                  <a:schemeClr val="bg1">
-                    <a:lumMod val="50000"/>
-                  </a:schemeClr>
-                </a:solidFill>
-              </a:rPr>
-              <a:t>Public health practice surveillance </a:t>
-            </a:r>
-            <a:r>
-              <a:rPr lang="en-US" sz="2000" dirty="0" smtClean="0">
-                <a:solidFill>
-                  <a:schemeClr val="bg1">
-                    <a:lumMod val="50000"/>
-                  </a:schemeClr>
-                </a:solidFill>
-              </a:rPr>
-              <a:t>activities</a:t>
-            </a:r>
-            <a:endParaRPr lang="en-US" sz="2000" dirty="0">
-              <a:solidFill>
-                <a:schemeClr val="bg1">
-                  <a:lumMod val="50000"/>
-                </a:schemeClr>
-              </a:solidFill>
+            <a:endParaRPr lang="en-US" sz="2200" b="1" i="1" dirty="0">
+              <a:latin typeface="+mj-lt"/>
+              <a:ea typeface="+mj-ea"/>
+              <a:cs typeface="+mj-cs"/>
             </a:endParaRPr>
           </a:p>
         </p:txBody>
@@ -5250,7 +5531,167 @@
     </p:spTree>
     <p:extLst>
       <p:ext uri="{BB962C8B-B14F-4D97-AF65-F5344CB8AC3E}">
-        <p14:creationId xmlns:p14="http://schemas.microsoft.com/office/powerpoint/2010/main" val="1045530161"/>
+        <p14:creationId xmlns:p14="http://schemas.microsoft.com/office/powerpoint/2010/main" val="172627691"/>
+      </p:ext>
+    </p:extLst>
+  </p:cSld>
+  <p:clrMapOvr>
+    <a:masterClrMapping/>
+  </p:clrMapOvr>
+</p:sld>
+</file>
+
+<file path=ppt/slides/slide12.xml><?xml version="1.0" encoding="utf-8"?>
+<p:sld xmlns:a="http://schemas.openxmlformats.org/drawingml/2006/main" xmlns:r="http://schemas.openxmlformats.org/officeDocument/2006/relationships" xmlns:p="http://schemas.openxmlformats.org/presentationml/2006/main">
+  <p:cSld>
+    <p:spTree>
+      <p:nvGrpSpPr>
+        <p:cNvPr id="1" name=""/>
+        <p:cNvGrpSpPr/>
+        <p:nvPr/>
+      </p:nvGrpSpPr>
+      <p:grpSpPr>
+        <a:xfrm>
+          <a:off x="0" y="0"/>
+          <a:ext cx="0" cy="0"/>
+          <a:chOff x="0" y="0"/>
+          <a:chExt cx="0" cy="0"/>
+        </a:xfrm>
+      </p:grpSpPr>
+      <p:sp>
+        <p:nvSpPr>
+          <p:cNvPr id="3" name="Content Placeholder 2"/>
+          <p:cNvSpPr>
+            <a:spLocks noGrp="1"/>
+          </p:cNvSpPr>
+          <p:nvPr>
+            <p:ph idx="1"/>
+          </p:nvPr>
+        </p:nvSpPr>
+        <p:spPr>
+          <a:xfrm>
+            <a:off x="298383" y="882994"/>
+            <a:ext cx="11704320" cy="5795124"/>
+          </a:xfrm>
+        </p:spPr>
+        <p:txBody>
+          <a:bodyPr>
+            <a:normAutofit/>
+          </a:bodyPr>
+          <a:lstStyle/>
+          <a:p>
+            <a:r>
+              <a:rPr lang="en-US" dirty="0" smtClean="0"/>
+              <a:t>People expect that national collaborations will be more common and important. This design has better coverage and detection of phenomena.</a:t>
+            </a:r>
+          </a:p>
+          <a:p>
+            <a:r>
+              <a:rPr lang="en-US" dirty="0" smtClean="0"/>
+              <a:t>The CRDW has invested in supporting these more efficiently.</a:t>
+            </a:r>
+          </a:p>
+          <a:p>
+            <a:endParaRPr lang="en-US" dirty="0" smtClean="0"/>
+          </a:p>
+          <a:p>
+            <a:r>
+              <a:rPr lang="en-US" dirty="0" smtClean="0"/>
+              <a:t>The 1</a:t>
+            </a:r>
+            <a:r>
+              <a:rPr lang="en-US" baseline="30000" dirty="0" smtClean="0"/>
+              <a:t>st</a:t>
+            </a:r>
+            <a:r>
+              <a:rPr lang="en-US" dirty="0" smtClean="0"/>
+              <a:t> two registries use a structure specific to their project.</a:t>
+            </a:r>
+          </a:p>
+          <a:p>
+            <a:r>
+              <a:rPr lang="en-US" dirty="0" smtClean="0"/>
+              <a:t>N3C uses OHDSI’s </a:t>
+            </a:r>
+            <a:r>
+              <a:rPr lang="en-US" dirty="0" smtClean="0">
+                <a:hlinkClick r:id="rId2"/>
+              </a:rPr>
+              <a:t>OMOP</a:t>
+            </a:r>
+            <a:r>
+              <a:rPr lang="en-US" dirty="0" smtClean="0"/>
+              <a:t>, which is designed to accommodate many institutions and scientific questions.  The barrier to contribute to OMOP registries is much lower than registries with a </a:t>
+            </a:r>
+            <a:r>
+              <a:rPr lang="en-US" smtClean="0"/>
+              <a:t>one-off structure.</a:t>
+            </a:r>
+            <a:endParaRPr lang="en-US" dirty="0"/>
+          </a:p>
+        </p:txBody>
+      </p:sp>
+      <p:sp>
+        <p:nvSpPr>
+          <p:cNvPr id="4" name="Title 1"/>
+          <p:cNvSpPr txBox="1">
+            <a:spLocks/>
+          </p:cNvSpPr>
+          <p:nvPr/>
+        </p:nvSpPr>
+        <p:spPr>
+          <a:xfrm>
+            <a:off x="781050" y="78400"/>
+            <a:ext cx="10515600" cy="804594"/>
+          </a:xfrm>
+          <a:prstGeom prst="rect">
+            <a:avLst/>
+          </a:prstGeom>
+        </p:spPr>
+        <p:txBody>
+          <a:bodyPr vert="horz" lIns="91440" tIns="45720" rIns="91440" bIns="45720" rtlCol="0" anchor="ctr">
+            <a:normAutofit/>
+          </a:bodyPr>
+          <a:lstStyle>
+            <a:lvl1pPr algn="l" defTabSz="914400" rtl="0" eaLnBrk="1" latinLnBrk="0" hangingPunct="1">
+              <a:lnSpc>
+                <a:spcPct val="90000"/>
+              </a:lnSpc>
+              <a:spcBef>
+                <a:spcPct val="0"/>
+              </a:spcBef>
+              <a:buNone/>
+              <a:defRPr sz="4400" kern="1200">
+                <a:solidFill>
+                  <a:schemeClr val="tx1"/>
+                </a:solidFill>
+                <a:latin typeface="+mj-lt"/>
+                <a:ea typeface="+mj-ea"/>
+                <a:cs typeface="+mj-cs"/>
+              </a:defRPr>
+            </a:lvl1pPr>
+          </a:lstStyle>
+          <a:p>
+            <a:r>
+              <a:rPr lang="en-US" sz="3600" b="1" i="1" dirty="0" smtClean="0">
+                <a:solidFill>
+                  <a:srgbClr val="0070C0"/>
+                </a:solidFill>
+              </a:rPr>
+              <a:t>OMOP, N3C, and the future of large investigations</a:t>
+            </a:r>
+            <a:endParaRPr lang="en-US" sz="3600" b="1" i="1" dirty="0">
+              <a:solidFill>
+                <a:srgbClr val="0070C0"/>
+              </a:solidFill>
+            </a:endParaRPr>
+          </a:p>
+        </p:txBody>
+      </p:sp>
+    </p:spTree>
+    <p:extLst>
+      <p:ext uri="{BB962C8B-B14F-4D97-AF65-F5344CB8AC3E}">
+        <p14:creationId xmlns:p14="http://schemas.microsoft.com/office/powerpoint/2010/main" val="1168428789"/>
       </p:ext>
     </p:extLst>
   </p:cSld>
@@ -5267,7 +5708,7 @@
 </p:sld>
 </file>
 
-<file path=ppt/slides/slide12.xml><?xml version="1.0" encoding="utf-8"?>
+<file path=ppt/slides/slide13.xml><?xml version="1.0" encoding="utf-8"?>
 <p:sld xmlns:a="http://schemas.openxmlformats.org/drawingml/2006/main" xmlns:r="http://schemas.openxmlformats.org/officeDocument/2006/relationships" xmlns:p="http://schemas.openxmlformats.org/presentationml/2006/main">
   <p:cSld>
     <p:spTree>
@@ -5296,8 +5737,8 @@
         </p:nvSpPr>
         <p:spPr>
           <a:xfrm>
-            <a:off x="299185" y="25934"/>
-            <a:ext cx="10515600" cy="806214"/>
+            <a:off x="776452" y="19985"/>
+            <a:ext cx="10515600" cy="640416"/>
           </a:xfrm>
         </p:spPr>
         <p:txBody>
@@ -5307,26 +5748,13 @@
           <a:lstStyle/>
           <a:p>
             <a:r>
-              <a:rPr lang="en-US" sz="3600" b="1" i="1" dirty="0" smtClean="0">
+              <a:rPr lang="en-US" sz="3600" b="1" i="1" dirty="0">
                 <a:solidFill>
                   <a:srgbClr val="0070C0"/>
                 </a:solidFill>
               </a:rPr>
-              <a:t>National Registry </a:t>
-            </a:r>
-            <a:r>
-              <a:rPr lang="en-US" sz="3600" b="1" i="1" dirty="0" smtClean="0">
-                <a:solidFill>
-                  <a:srgbClr val="0070C0"/>
-                </a:solidFill>
-              </a:rPr>
-              <a:t>Projects</a:t>
-            </a:r>
-            <a:endParaRPr lang="en-US" sz="3600" b="1" i="1" dirty="0">
-              <a:solidFill>
-                <a:srgbClr val="0070C0"/>
-              </a:solidFill>
-            </a:endParaRPr>
+              <a:t>IRB and Privacy Review Guidance</a:t>
+            </a:r>
           </a:p>
         </p:txBody>
       </p:sp>
@@ -5342,78 +5770,114 @@
         </p:nvSpPr>
         <p:spPr>
           <a:xfrm>
-            <a:off x="9627" y="750772"/>
-            <a:ext cx="11935325" cy="5986912"/>
+            <a:off x="88900" y="660402"/>
+            <a:ext cx="12103099" cy="6197598"/>
           </a:xfrm>
         </p:spPr>
         <p:txBody>
           <a:bodyPr>
-            <a:normAutofit fontScale="92500" lnSpcReduction="20000"/>
+            <a:noAutofit/>
           </a:bodyPr>
           <a:lstStyle/>
           <a:p>
-            <a:pPr marL="0" indent="0">
-              <a:buNone/>
-            </a:pPr>
-            <a:r>
-              <a:rPr lang="en-US" dirty="0">
-                <a:latin typeface="+mj-lt"/>
+            <a:r>
+              <a:rPr lang="en-US" sz="2400" dirty="0" smtClean="0"/>
+              <a:t>Requests that are preparatory to research </a:t>
+            </a:r>
+            <a:r>
+              <a:rPr lang="en-US" sz="2400" dirty="0"/>
+              <a:t>must be submitted to the IRB/University Privacy </a:t>
+            </a:r>
+            <a:r>
+              <a:rPr lang="en-US" sz="2400" dirty="0" smtClean="0"/>
+              <a:t>Board for review and approval.</a:t>
+            </a:r>
+          </a:p>
+          <a:p>
+            <a:endParaRPr lang="en-US" sz="2400" dirty="0" smtClean="0"/>
+          </a:p>
+          <a:p>
+            <a:r>
+              <a:rPr lang="en-US" sz="2400" dirty="0" smtClean="0"/>
+              <a:t>Program Evaluation, CQI, &amp; Feasibility Assessments:</a:t>
+            </a:r>
+          </a:p>
+          <a:p>
+            <a:pPr lvl="1"/>
+            <a:r>
+              <a:rPr lang="en-US" sz="2000" dirty="0" smtClean="0"/>
+              <a:t>If PHI is </a:t>
+            </a:r>
+            <a:r>
+              <a:rPr lang="en-US" sz="2000" b="1" u="sng" dirty="0" smtClean="0"/>
+              <a:t>NOT</a:t>
+            </a:r>
+            <a:r>
+              <a:rPr lang="en-US" sz="2000" dirty="0" smtClean="0"/>
+              <a:t> included, it is generally not considered human subjects research.</a:t>
+            </a:r>
+          </a:p>
+          <a:p>
+            <a:pPr lvl="1"/>
+            <a:r>
+              <a:rPr lang="en-US" sz="2000" dirty="0" smtClean="0"/>
+              <a:t>A determination of human subjects research (DHSR) may be submitted to the IRB.</a:t>
+            </a:r>
+          </a:p>
+          <a:p>
+            <a:pPr lvl="1"/>
+            <a:r>
+              <a:rPr lang="en-US" sz="2000" dirty="0" smtClean="0"/>
+              <a:t>Aggregate data may be provided without an IRB submission.</a:t>
+            </a:r>
+          </a:p>
+          <a:p>
+            <a:endParaRPr lang="en-US" sz="2400" dirty="0" smtClean="0"/>
+          </a:p>
+          <a:p>
+            <a:r>
+              <a:rPr lang="en-US" sz="2400" dirty="0" smtClean="0">
+                <a:solidFill>
+                  <a:schemeClr val="bg1">
+                    <a:lumMod val="50000"/>
+                  </a:schemeClr>
+                </a:solidFill>
               </a:rPr>
-              <a:t>ORIEN </a:t>
-            </a:r>
-            <a:r>
-              <a:rPr lang="en-US" dirty="0" smtClean="0">
-                <a:latin typeface="+mj-lt"/>
+              <a:t>The following activities are </a:t>
+            </a:r>
+            <a:r>
+              <a:rPr lang="en-US" sz="2400" b="1" u="sng" dirty="0" smtClean="0">
+                <a:solidFill>
+                  <a:schemeClr val="bg1">
+                    <a:lumMod val="50000"/>
+                  </a:schemeClr>
+                </a:solidFill>
               </a:rPr>
-              <a:t>(</a:t>
-            </a:r>
-            <a:r>
-              <a:rPr lang="en-US" dirty="0" smtClean="0">
-                <a:latin typeface="+mj-lt"/>
-                <a:ea typeface="+mj-ea"/>
-                <a:cs typeface="+mj-cs"/>
+              <a:t>NOT</a:t>
+            </a:r>
+            <a:r>
+              <a:rPr lang="en-US" sz="2400" dirty="0" smtClean="0">
+                <a:solidFill>
+                  <a:schemeClr val="bg1">
+                    <a:lumMod val="50000"/>
+                  </a:schemeClr>
+                </a:solidFill>
               </a:rPr>
-              <a:t>Oncology </a:t>
-            </a:r>
-            <a:r>
-              <a:rPr lang="en-US" dirty="0" smtClean="0">
-                <a:latin typeface="+mj-lt"/>
-                <a:ea typeface="+mj-ea"/>
-                <a:cs typeface="+mj-cs"/>
+              <a:t> human subjects research:</a:t>
+            </a:r>
+          </a:p>
+          <a:p>
+            <a:pPr lvl="1"/>
+            <a:r>
+              <a:rPr lang="en-US" sz="2000" dirty="0">
+                <a:solidFill>
+                  <a:schemeClr val="bg1">
+                    <a:lumMod val="50000"/>
+                  </a:schemeClr>
+                </a:solidFill>
               </a:rPr>
-              <a:t>Research Information Exchange </a:t>
-            </a:r>
-            <a:r>
-              <a:rPr lang="en-US" dirty="0" smtClean="0">
-                <a:latin typeface="+mj-lt"/>
-                <a:ea typeface="+mj-ea"/>
-                <a:cs typeface="+mj-cs"/>
-              </a:rPr>
-              <a:t>Network) -</a:t>
-            </a:r>
-            <a:r>
-              <a:rPr lang="en-US" sz="2000" dirty="0" smtClean="0">
-                <a:latin typeface="+mj-lt"/>
-                <a:ea typeface="+mj-ea"/>
-                <a:cs typeface="+mj-cs"/>
-              </a:rPr>
-              <a:t>Stephenson </a:t>
-            </a:r>
-            <a:r>
-              <a:rPr lang="en-US" sz="2000" dirty="0" smtClean="0">
-                <a:latin typeface="+mj-lt"/>
-                <a:ea typeface="+mj-ea"/>
-                <a:cs typeface="+mj-cs"/>
-              </a:rPr>
-              <a:t>Cancer Center</a:t>
-            </a:r>
-            <a:endParaRPr lang="en-US" dirty="0" smtClean="0">
-              <a:latin typeface="+mj-lt"/>
-              <a:ea typeface="+mj-ea"/>
-              <a:cs typeface="+mj-cs"/>
-            </a:endParaRPr>
-          </a:p>
-          <a:p>
+              <a:t>Classroom evaluation activities when assessment involves regular classroom activities and the results of the evaluation process are intended to be used for the sole purpose of enhancing teaching practices of the </a:t>
+            </a:r>
             <a:r>
               <a:rPr lang="en-US" sz="2000" dirty="0" smtClean="0">
                 <a:solidFill>
@@ -5421,13 +5885,29 @@
                     <a:lumMod val="50000"/>
                   </a:schemeClr>
                 </a:solidFill>
-                <a:ea typeface="+mj-ea"/>
-                <a:cs typeface="+mj-cs"/>
               </a:rPr>
-              <a:t>This is a study designed to create a centralized clinical data and tissue repository. Clinical data, to include demographics, medical history, cancer classification, medical treatment, pathology records, long-term outcomes, quality of life, general health, laboratory, pathology, radiographic data/images, and cause of death, will be collected on all enrolled patients from the time of initial entry into the study and continue as long as the study remains in progress.</a:t>
-            </a:r>
-          </a:p>
-          <a:p>
+              <a:t>instructor</a:t>
+            </a:r>
+            <a:endParaRPr lang="en-US" sz="2000" dirty="0">
+              <a:solidFill>
+                <a:schemeClr val="bg1">
+                  <a:lumMod val="50000"/>
+                </a:schemeClr>
+              </a:solidFill>
+            </a:endParaRPr>
+          </a:p>
+          <a:p>
+            <a:pPr lvl="1"/>
+            <a:r>
+              <a:rPr lang="en-US" sz="2000" dirty="0">
+                <a:solidFill>
+                  <a:schemeClr val="bg1">
+                    <a:lumMod val="50000"/>
+                  </a:schemeClr>
+                </a:solidFill>
+              </a:rPr>
+              <a:t>Quality improvement activities designed to enhance functionality of a department or campus program provided that results are not intended to be shared outside of the </a:t>
+            </a:r>
             <a:r>
               <a:rPr lang="en-US" sz="2000" dirty="0" smtClean="0">
                 <a:solidFill>
@@ -5435,10 +5915,28 @@
                     <a:lumMod val="50000"/>
                   </a:schemeClr>
                 </a:solidFill>
-                <a:ea typeface="+mj-ea"/>
-                <a:cs typeface="+mj-cs"/>
               </a:rPr>
-              <a:t>Given the scope, manual data abstraction proved to be very resource intensive. The </a:t>
+              <a:t>University</a:t>
+            </a:r>
+            <a:endParaRPr lang="en-US" sz="2000" dirty="0">
+              <a:solidFill>
+                <a:schemeClr val="bg1">
+                  <a:lumMod val="50000"/>
+                </a:schemeClr>
+              </a:solidFill>
+            </a:endParaRPr>
+          </a:p>
+          <a:p>
+            <a:pPr lvl="1"/>
+            <a:r>
+              <a:rPr lang="en-US" sz="2000" dirty="0">
+                <a:solidFill>
+                  <a:schemeClr val="bg1">
+                    <a:lumMod val="50000"/>
+                  </a:schemeClr>
+                </a:solidFill>
+              </a:rPr>
+              <a:t>Program </a:t>
             </a:r>
             <a:r>
               <a:rPr lang="en-US" sz="2000" dirty="0" smtClean="0">
@@ -5447,10 +5945,28 @@
                     <a:lumMod val="50000"/>
                   </a:schemeClr>
                 </a:solidFill>
-                <a:ea typeface="+mj-ea"/>
-                <a:cs typeface="+mj-cs"/>
               </a:rPr>
-              <a:t>CRDW </a:t>
+              <a:t>evaluations</a:t>
+            </a:r>
+            <a:endParaRPr lang="en-US" sz="2000" dirty="0">
+              <a:solidFill>
+                <a:schemeClr val="bg1">
+                  <a:lumMod val="50000"/>
+                </a:schemeClr>
+              </a:solidFill>
+            </a:endParaRPr>
+          </a:p>
+          <a:p>
+            <a:pPr lvl="1"/>
+            <a:r>
+              <a:rPr lang="en-US" sz="2000" dirty="0">
+                <a:solidFill>
+                  <a:schemeClr val="bg1">
+                    <a:lumMod val="50000"/>
+                  </a:schemeClr>
+                </a:solidFill>
+              </a:rPr>
+              <a:t>Public health practice surveillance </a:t>
             </a:r>
             <a:r>
               <a:rPr lang="en-US" sz="2000" dirty="0" smtClean="0">
@@ -5459,186 +5975,8 @@
                     <a:lumMod val="50000"/>
                   </a:schemeClr>
                 </a:solidFill>
-                <a:ea typeface="+mj-ea"/>
-                <a:cs typeface="+mj-cs"/>
               </a:rPr>
-              <a:t>team was consulted to explore the feasibility of extracting pathology records. </a:t>
-            </a:r>
-          </a:p>
-          <a:p>
-            <a:r>
-              <a:rPr lang="en-US" sz="2000" dirty="0" smtClean="0">
-                <a:solidFill>
-                  <a:schemeClr val="bg1">
-                    <a:lumMod val="50000"/>
-                  </a:schemeClr>
-                </a:solidFill>
-                <a:ea typeface="+mj-ea"/>
-                <a:cs typeface="+mj-cs"/>
-              </a:rPr>
-              <a:t>The data specifications required more than the pathology result value (e.g. reference range, critical value, etc.), which necessitated the use of ‘</a:t>
-            </a:r>
-            <a:r>
-              <a:rPr lang="en-US" sz="2000" dirty="0" err="1" smtClean="0">
-                <a:solidFill>
-                  <a:schemeClr val="bg1">
-                    <a:lumMod val="50000"/>
-                  </a:schemeClr>
-                </a:solidFill>
-                <a:ea typeface="+mj-ea"/>
-                <a:cs typeface="+mj-cs"/>
-              </a:rPr>
-              <a:t>docdata</a:t>
-            </a:r>
-            <a:r>
-              <a:rPr lang="en-US" sz="2000" dirty="0" smtClean="0">
-                <a:solidFill>
-                  <a:schemeClr val="bg1">
-                    <a:lumMod val="50000"/>
-                  </a:schemeClr>
-                </a:solidFill>
-                <a:ea typeface="+mj-ea"/>
-                <a:cs typeface="+mj-cs"/>
-              </a:rPr>
-              <a:t>’, regexes for text parsing,… </a:t>
-            </a:r>
-          </a:p>
-          <a:p>
-            <a:endParaRPr lang="en-US" sz="2600" b="1" i="1" dirty="0" smtClean="0">
-              <a:latin typeface="+mj-lt"/>
-              <a:ea typeface="+mj-ea"/>
-              <a:cs typeface="+mj-cs"/>
-            </a:endParaRPr>
-          </a:p>
-          <a:p>
-            <a:pPr marL="0" indent="0">
-              <a:buNone/>
-            </a:pPr>
-            <a:r>
-              <a:rPr lang="en-US" dirty="0" smtClean="0">
-                <a:latin typeface="+mj-lt"/>
-                <a:ea typeface="+mj-ea"/>
-                <a:cs typeface="+mj-cs"/>
-              </a:rPr>
-              <a:t>Oncologic Outcomes in Renal Cell </a:t>
-            </a:r>
-            <a:r>
-              <a:rPr lang="en-US" dirty="0" smtClean="0">
-                <a:latin typeface="+mj-lt"/>
-                <a:ea typeface="+mj-ea"/>
-                <a:cs typeface="+mj-cs"/>
-              </a:rPr>
-              <a:t>Carcinoma</a:t>
-            </a:r>
-            <a:r>
-              <a:rPr lang="en-US" sz="2400" b="1" dirty="0" smtClean="0">
-                <a:latin typeface="+mj-lt"/>
-                <a:ea typeface="+mj-ea"/>
-                <a:cs typeface="+mj-cs"/>
-              </a:rPr>
-              <a:t> -</a:t>
-            </a:r>
-            <a:r>
-              <a:rPr lang="en-US" sz="2000" dirty="0" smtClean="0">
-                <a:latin typeface="+mj-lt"/>
-                <a:ea typeface="+mj-ea"/>
-                <a:cs typeface="+mj-cs"/>
-              </a:rPr>
-              <a:t>OUHSC </a:t>
-            </a:r>
-            <a:r>
-              <a:rPr lang="en-US" sz="2000" dirty="0" smtClean="0">
-                <a:latin typeface="+mj-lt"/>
-                <a:ea typeface="+mj-ea"/>
-                <a:cs typeface="+mj-cs"/>
-              </a:rPr>
-              <a:t>Department of </a:t>
-            </a:r>
-            <a:r>
-              <a:rPr lang="en-US" sz="2000" dirty="0" smtClean="0">
-                <a:latin typeface="+mj-lt"/>
-                <a:ea typeface="+mj-ea"/>
-                <a:cs typeface="+mj-cs"/>
-              </a:rPr>
-              <a:t>Urology</a:t>
-            </a:r>
-            <a:endParaRPr lang="en-US" sz="2400" dirty="0" smtClean="0">
-              <a:latin typeface="+mj-lt"/>
-              <a:ea typeface="+mj-ea"/>
-              <a:cs typeface="+mj-cs"/>
-            </a:endParaRPr>
-          </a:p>
-          <a:p>
-            <a:r>
-              <a:rPr lang="en-US" sz="2000" dirty="0" smtClean="0">
-                <a:solidFill>
-                  <a:schemeClr val="bg1">
-                    <a:lumMod val="50000"/>
-                  </a:schemeClr>
-                </a:solidFill>
-                <a:ea typeface="+mj-ea"/>
-                <a:cs typeface="+mj-cs"/>
-              </a:rPr>
-              <a:t>The </a:t>
-            </a:r>
-            <a:r>
-              <a:rPr lang="en-US" sz="2000" dirty="0">
-                <a:solidFill>
-                  <a:schemeClr val="bg1">
-                    <a:lumMod val="50000"/>
-                  </a:schemeClr>
-                </a:solidFill>
-                <a:ea typeface="+mj-ea"/>
-                <a:cs typeface="+mj-cs"/>
-              </a:rPr>
-              <a:t>primary objective of this study is to establish a kidney cancer registry to enable investigations of patients evaluated and treated for kidney cancer, with emphasis on efficacy of surgical technique, postoperative complication rates, response to immunotherapy, and utility of biomarkers/genomic tests. </a:t>
-            </a:r>
-            <a:endParaRPr lang="en-US" sz="2000" dirty="0" smtClean="0">
-              <a:solidFill>
-                <a:schemeClr val="bg1">
-                  <a:lumMod val="50000"/>
-                </a:schemeClr>
-              </a:solidFill>
-              <a:ea typeface="+mj-ea"/>
-              <a:cs typeface="+mj-cs"/>
-            </a:endParaRPr>
-          </a:p>
-          <a:p>
-            <a:r>
-              <a:rPr lang="en-US" sz="2000" dirty="0" smtClean="0">
-                <a:solidFill>
-                  <a:schemeClr val="bg1">
-                    <a:lumMod val="50000"/>
-                  </a:schemeClr>
-                </a:solidFill>
-                <a:ea typeface="+mj-ea"/>
-                <a:cs typeface="+mj-cs"/>
-              </a:rPr>
-              <a:t>The CDW was asked to assemble a list of patients diagnosed with kidney cancer since 2010. The study team will retrospectively populate a </a:t>
-            </a:r>
-            <a:r>
-              <a:rPr lang="en-US" sz="2000" dirty="0" err="1" smtClean="0">
-                <a:solidFill>
-                  <a:schemeClr val="bg1">
-                    <a:lumMod val="50000"/>
-                  </a:schemeClr>
-                </a:solidFill>
-                <a:ea typeface="+mj-ea"/>
-                <a:cs typeface="+mj-cs"/>
-              </a:rPr>
-              <a:t>REDCap</a:t>
-            </a:r>
-            <a:r>
-              <a:rPr lang="en-US" sz="2000" dirty="0" smtClean="0">
-                <a:solidFill>
-                  <a:schemeClr val="bg1">
-                    <a:lumMod val="50000"/>
-                  </a:schemeClr>
-                </a:solidFill>
-                <a:ea typeface="+mj-ea"/>
-                <a:cs typeface="+mj-cs"/>
-              </a:rPr>
-              <a:t> project with the desired clinical data for this cohort as well as prospectively enroll current and future patients.</a:t>
+              <a:t>activities</a:t>
             </a:r>
             <a:endParaRPr lang="en-US" sz="2000" dirty="0">
               <a:solidFill>
@@ -5646,62 +5984,6 @@
                   <a:lumMod val="50000"/>
                 </a:schemeClr>
               </a:solidFill>
-              <a:ea typeface="+mj-ea"/>
-              <a:cs typeface="+mj-cs"/>
-            </a:endParaRPr>
-          </a:p>
-          <a:p>
-            <a:pPr lvl="1"/>
-            <a:endParaRPr lang="en-US" sz="2200" b="1" i="1" dirty="0" smtClean="0">
-              <a:latin typeface="+mj-lt"/>
-              <a:ea typeface="+mj-ea"/>
-              <a:cs typeface="+mj-cs"/>
-            </a:endParaRPr>
-          </a:p>
-          <a:p>
-            <a:pPr marL="0" indent="0">
-              <a:buNone/>
-            </a:pPr>
-            <a:r>
-              <a:rPr lang="en-US" dirty="0">
-                <a:latin typeface="+mj-lt"/>
-              </a:rPr>
-              <a:t>N3C (National COVID Cohort Collaborative</a:t>
-            </a:r>
-            <a:r>
-              <a:rPr lang="en-US" dirty="0" smtClean="0">
-                <a:latin typeface="+mj-lt"/>
-              </a:rPr>
-              <a:t>)</a:t>
-            </a:r>
-            <a:r>
-              <a:rPr lang="en-US" dirty="0">
-                <a:latin typeface="+mj-lt"/>
-              </a:rPr>
-              <a:t> </a:t>
-            </a:r>
-            <a:r>
-              <a:rPr lang="en-US" sz="2400" b="1" dirty="0" smtClean="0">
-                <a:latin typeface="+mj-lt"/>
-              </a:rPr>
-              <a:t>-</a:t>
-            </a:r>
-            <a:r>
-              <a:rPr lang="en-US" sz="2000" dirty="0">
-                <a:latin typeface="+mj-lt"/>
-              </a:rPr>
-              <a:t>OUHSC </a:t>
-            </a:r>
-            <a:endParaRPr lang="en-US" dirty="0">
-              <a:latin typeface="+mj-lt"/>
-            </a:endParaRPr>
-          </a:p>
-          <a:p>
-            <a:pPr lvl="1"/>
-            <a:endParaRPr lang="en-US" sz="2200" b="1" i="1" dirty="0">
-              <a:latin typeface="+mj-lt"/>
-              <a:ea typeface="+mj-ea"/>
-              <a:cs typeface="+mj-cs"/>
             </a:endParaRPr>
           </a:p>
         </p:txBody>
@@ -5709,17 +5991,24 @@
     </p:spTree>
     <p:extLst>
       <p:ext uri="{BB962C8B-B14F-4D97-AF65-F5344CB8AC3E}">
-        <p14:creationId xmlns:p14="http://schemas.microsoft.com/office/powerpoint/2010/main" val="172627691"/>
+        <p14:creationId xmlns:p14="http://schemas.microsoft.com/office/powerpoint/2010/main" val="1045530161"/>
       </p:ext>
     </p:extLst>
   </p:cSld>
   <p:clrMapOvr>
     <a:masterClrMapping/>
   </p:clrMapOvr>
+  <p:timing>
+    <p:tnLst>
+      <p:par>
+        <p:cTn id="1" dur="indefinite" restart="never" nodeType="tmRoot"/>
+      </p:par>
+    </p:tnLst>
+  </p:timing>
 </p:sld>
 </file>
 
-<file path=ppt/slides/slide13.xml><?xml version="1.0" encoding="utf-8"?>
+<file path=ppt/slides/slide14.xml><?xml version="1.0" encoding="utf-8"?>
 <p:sld xmlns:a="http://schemas.openxmlformats.org/drawingml/2006/main" xmlns:r="http://schemas.openxmlformats.org/officeDocument/2006/relationships" xmlns:p="http://schemas.openxmlformats.org/presentationml/2006/main">
   <p:cSld>
     <p:spTree>
@@ -5808,23 +6097,7 @@
                 <a:ea typeface="+mj-ea"/>
                 <a:cs typeface="+mj-cs"/>
               </a:rPr>
-              <a:t>PhD, </a:t>
-            </a:r>
-            <a:r>
-              <a:rPr lang="en-US" sz="2200" b="1" dirty="0" smtClean="0">
-                <a:latin typeface="+mj-lt"/>
-                <a:ea typeface="+mj-ea"/>
-                <a:cs typeface="+mj-cs"/>
-              </a:rPr>
-              <a:t>Chief Research Information </a:t>
-            </a:r>
-            <a:r>
-              <a:rPr lang="en-US" sz="2200" b="1" dirty="0" smtClean="0">
-                <a:latin typeface="+mj-lt"/>
-                <a:ea typeface="+mj-ea"/>
-                <a:cs typeface="+mj-cs"/>
-              </a:rPr>
-              <a:t>Officer</a:t>
+              <a:t>PhD, Chief Research Information Officer</a:t>
             </a:r>
             <a:endParaRPr lang="en-US" sz="2200" b="1" dirty="0">
               <a:latin typeface="+mj-lt"/>
@@ -5858,23 +6131,7 @@
                 <a:ea typeface="+mj-ea"/>
                 <a:cs typeface="+mj-cs"/>
               </a:rPr>
-              <a:t>PhD, </a:t>
-            </a:r>
-            <a:r>
-              <a:rPr lang="en-US" sz="2200" b="1" dirty="0" smtClean="0">
-                <a:latin typeface="+mj-lt"/>
-                <a:ea typeface="+mj-ea"/>
-                <a:cs typeface="+mj-cs"/>
-              </a:rPr>
-              <a:t>BBMC Director of </a:t>
-            </a:r>
-            <a:r>
-              <a:rPr lang="en-US" sz="2200" b="1" dirty="0" smtClean="0">
-                <a:latin typeface="+mj-lt"/>
-                <a:ea typeface="+mj-ea"/>
-                <a:cs typeface="+mj-cs"/>
-              </a:rPr>
-              <a:t>Informatics</a:t>
+              <a:t>PhD, BBMC Director of Informatics</a:t>
             </a:r>
             <a:endParaRPr lang="en-US" sz="2200" b="1" dirty="0">
               <a:latin typeface="+mj-lt"/>
@@ -5900,15 +6157,7 @@
                 <a:ea typeface="+mj-ea"/>
                 <a:cs typeface="+mj-cs"/>
               </a:rPr>
-              <a:t>DeShea, </a:t>
-            </a:r>
-            <a:r>
-              <a:rPr lang="en-US" sz="2200" b="1" dirty="0" smtClean="0">
-                <a:latin typeface="+mj-lt"/>
-                <a:ea typeface="+mj-ea"/>
-                <a:cs typeface="+mj-cs"/>
-              </a:rPr>
-              <a:t>PhD </a:t>
+              <a:t>DeShea, PhD </a:t>
             </a:r>
             <a:r>
               <a:rPr lang="en-US" sz="2100" dirty="0">
@@ -6001,17 +6250,7 @@
                   </a:schemeClr>
                 </a:solidFill>
               </a:rPr>
-              <a:t>CRDW team </a:t>
-            </a:r>
-            <a:r>
-              <a:rPr lang="en-US" sz="2100" dirty="0" smtClean="0">
-                <a:solidFill>
-                  <a:schemeClr val="bg1">
-                    <a:lumMod val="50000"/>
-                  </a:schemeClr>
-                </a:solidFill>
-              </a:rPr>
-              <a:t>in August 2020 after </a:t>
+              <a:t>CRDW team in August 2020 after </a:t>
             </a:r>
             <a:r>
               <a:rPr lang="en-US" sz="2100" dirty="0">
@@ -6172,47 +6411,7 @@
                   </a:schemeClr>
                 </a:solidFill>
               </a:rPr>
-              <a:t>has 15 years of healthcare administration experience. Prior to joining the </a:t>
-            </a:r>
-            <a:r>
-              <a:rPr lang="en-US" sz="2100" dirty="0" smtClean="0">
-                <a:solidFill>
-                  <a:schemeClr val="bg1">
-                    <a:lumMod val="50000"/>
-                  </a:schemeClr>
-                </a:solidFill>
-              </a:rPr>
-              <a:t>CRDW </a:t>
-            </a:r>
-            <a:r>
-              <a:rPr lang="en-US" sz="2100" dirty="0" smtClean="0">
-                <a:solidFill>
-                  <a:schemeClr val="bg1">
-                    <a:lumMod val="50000"/>
-                  </a:schemeClr>
-                </a:solidFill>
-              </a:rPr>
-              <a:t>team in October 2017, she served as a Clinic Administrator and Quality Manager for OU Physicians. Ashley has end-user experience with many of the data systems on campus and is the </a:t>
-            </a:r>
-            <a:r>
-              <a:rPr lang="en-US" sz="2100" dirty="0" smtClean="0">
-                <a:solidFill>
-                  <a:schemeClr val="bg1">
-                    <a:lumMod val="50000"/>
-                  </a:schemeClr>
-                </a:solidFill>
-              </a:rPr>
-              <a:t>CRDW’s </a:t>
-            </a:r>
-            <a:r>
-              <a:rPr lang="en-US" sz="2100" dirty="0" smtClean="0">
-                <a:solidFill>
-                  <a:schemeClr val="bg1">
-                    <a:lumMod val="50000"/>
-                  </a:schemeClr>
-                </a:solidFill>
-              </a:rPr>
-              <a:t>primary liaison with investigators.</a:t>
+              <a:t>has 15 years of healthcare administration experience. Prior to joining the CRDW team in October 2017, she served as a Clinic Administrator and Quality Manager for OU Physicians. Ashley has end-user experience with many of the data systems on campus and is the CRDW’s primary liaison with investigators.</a:t>
             </a:r>
             <a:endParaRPr lang="en-US" sz="2100" dirty="0">
               <a:solidFill>
@@ -6237,7 +6436,7 @@
 </p:sld>
 </file>
 
-<file path=ppt/slides/slide14.xml><?xml version="1.0" encoding="utf-8"?>
+<file path=ppt/slides/slide15.xml><?xml version="1.0" encoding="utf-8"?>
 <p:sld xmlns:a="http://schemas.openxmlformats.org/drawingml/2006/main" xmlns:r="http://schemas.openxmlformats.org/officeDocument/2006/relationships" xmlns:p="http://schemas.openxmlformats.org/presentationml/2006/main">
   <p:cSld>
     <p:spTree>
@@ -6662,7 +6861,7 @@
 </p:sld>
 </file>
 
-<file path=ppt/slides/slide15.xml><?xml version="1.0" encoding="utf-8"?>
+<file path=ppt/slides/slide16.xml><?xml version="1.0" encoding="utf-8"?>
 <p:sld xmlns:a="http://schemas.openxmlformats.org/drawingml/2006/main" xmlns:r="http://schemas.openxmlformats.org/officeDocument/2006/relationships" xmlns:p="http://schemas.openxmlformats.org/presentationml/2006/main">
   <p:cSld>
     <p:bg>
@@ -7152,13 +7351,8 @@
             </a:r>
             <a:r>
               <a:rPr lang="en-US" sz="2400" dirty="0" smtClean="0"/>
-              <a:t>(column 5): 	</a:t>
-            </a:r>
-            <a:r>
-              <a:rPr lang="en-US" sz="2400" dirty="0" smtClean="0"/>
-              <a:t>transformed to facilitate analyses of a specific research project</a:t>
-            </a:r>
-            <a:endParaRPr lang="en-US" sz="2400" dirty="0" smtClean="0"/>
+              <a:t>(column 5): 	transformed to facilitate analyses of a specific research project</a:t>
+            </a:r>
           </a:p>
           <a:p>
             <a:pPr lvl="1">
@@ -7197,11 +7391,7 @@
             </a:r>
             <a:r>
               <a:rPr lang="en-US" sz="4400" dirty="0" smtClean="0"/>
-              <a:t>– </a:t>
-            </a:r>
-            <a:r>
-              <a:rPr lang="en-US" sz="4400" dirty="0" smtClean="0"/>
-              <a:t>CRDW</a:t>
+              <a:t>– CRDW</a:t>
             </a:r>
             <a:r>
               <a:rPr lang="en-US" sz="2800" dirty="0" smtClean="0">
@@ -7212,40 +7402,7 @@
                   </a:schemeClr>
                 </a:solidFill>
               </a:rPr>
-              <a:t> </a:t>
-            </a:r>
-            <a:r>
-              <a:rPr lang="en-US" sz="2800" dirty="0" smtClean="0">
-                <a:solidFill>
-                  <a:schemeClr val="tx1">
-                    <a:lumMod val="50000"/>
-                    <a:lumOff val="50000"/>
-                  </a:schemeClr>
-                </a:solidFill>
-              </a:rPr>
-              <a:t>(Clinical </a:t>
-            </a:r>
-            <a:r>
-              <a:rPr lang="en-US" sz="2800" dirty="0" smtClean="0">
-                <a:solidFill>
-                  <a:schemeClr val="tx1">
-                    <a:lumMod val="50000"/>
-                    <a:lumOff val="50000"/>
-                  </a:schemeClr>
-                </a:solidFill>
-              </a:rPr>
-              <a:t>Research Data </a:t>
-            </a:r>
-            <a:r>
-              <a:rPr lang="en-US" sz="2800" dirty="0" smtClean="0">
-                <a:solidFill>
-                  <a:schemeClr val="tx1">
-                    <a:lumMod val="50000"/>
-                    <a:lumOff val="50000"/>
-                  </a:schemeClr>
-                </a:solidFill>
-              </a:rPr>
-              <a:t>Warehouse)</a:t>
+              <a:t> (Clinical Research Data Warehouse)</a:t>
             </a:r>
             <a:endParaRPr lang="en-US" sz="4400" dirty="0" smtClean="0">
               <a:solidFill>
@@ -7731,15 +7888,7 @@
                   <a:srgbClr val="0070C0"/>
                 </a:solidFill>
               </a:rPr>
-              <a:t>CRDW </a:t>
-            </a:r>
-            <a:r>
-              <a:rPr lang="en-US" b="1" i="1" dirty="0" smtClean="0">
-                <a:solidFill>
-                  <a:srgbClr val="0070C0"/>
-                </a:solidFill>
-              </a:rPr>
-              <a:t>Research project</a:t>
+              <a:t>CRDW Research project</a:t>
             </a:r>
           </a:p>
           <a:p>
@@ -7959,21 +8108,21 @@
                 <a:gridCol w="3021582">
                   <a:extLst>
                     <a:ext uri="{9D8B030D-6E8A-4147-A177-3AD203B41FA5}">
-                      <a16:colId xmlns:a16="http://schemas.microsoft.com/office/drawing/2014/main" xmlns="" val="1356431335"/>
+                      <a16:colId xmlns="" xmlns:a16="http://schemas.microsoft.com/office/drawing/2014/main" val="1356431335"/>
                     </a:ext>
                   </a:extLst>
                 </a:gridCol>
                 <a:gridCol w="1175819">
                   <a:extLst>
                     <a:ext uri="{9D8B030D-6E8A-4147-A177-3AD203B41FA5}">
-                      <a16:colId xmlns:a16="http://schemas.microsoft.com/office/drawing/2014/main" xmlns="" val="4074852346"/>
+                      <a16:colId xmlns="" xmlns:a16="http://schemas.microsoft.com/office/drawing/2014/main" val="4074852346"/>
                     </a:ext>
                   </a:extLst>
                 </a:gridCol>
                 <a:gridCol w="1175819">
                   <a:extLst>
                     <a:ext uri="{9D8B030D-6E8A-4147-A177-3AD203B41FA5}">
-                      <a16:colId xmlns:a16="http://schemas.microsoft.com/office/drawing/2014/main" xmlns="" val="715510892"/>
+                      <a16:colId xmlns="" xmlns:a16="http://schemas.microsoft.com/office/drawing/2014/main" val="715510892"/>
                     </a:ext>
                   </a:extLst>
                 </a:gridCol>
@@ -8050,7 +8199,7 @@
                 </a:tc>
                 <a:extLst>
                   <a:ext uri="{0D108BD9-81ED-4DB2-BD59-A6C34878D82A}">
-                    <a16:rowId xmlns:a16="http://schemas.microsoft.com/office/drawing/2014/main" xmlns="" val="1236399335"/>
+                    <a16:rowId xmlns="" xmlns:a16="http://schemas.microsoft.com/office/drawing/2014/main" val="1236399335"/>
                   </a:ext>
                 </a:extLst>
               </a:tr>
@@ -8126,7 +8275,7 @@
                 </a:tc>
                 <a:extLst>
                   <a:ext uri="{0D108BD9-81ED-4DB2-BD59-A6C34878D82A}">
-                    <a16:rowId xmlns:a16="http://schemas.microsoft.com/office/drawing/2014/main" xmlns="" val="3548785687"/>
+                    <a16:rowId xmlns="" xmlns:a16="http://schemas.microsoft.com/office/drawing/2014/main" val="3548785687"/>
                   </a:ext>
                 </a:extLst>
               </a:tr>
@@ -8202,7 +8351,7 @@
                 </a:tc>
                 <a:extLst>
                   <a:ext uri="{0D108BD9-81ED-4DB2-BD59-A6C34878D82A}">
-                    <a16:rowId xmlns:a16="http://schemas.microsoft.com/office/drawing/2014/main" xmlns="" val="949879066"/>
+                    <a16:rowId xmlns="" xmlns:a16="http://schemas.microsoft.com/office/drawing/2014/main" val="949879066"/>
                   </a:ext>
                 </a:extLst>
               </a:tr>
@@ -8278,7 +8427,7 @@
                 </a:tc>
                 <a:extLst>
                   <a:ext uri="{0D108BD9-81ED-4DB2-BD59-A6C34878D82A}">
-                    <a16:rowId xmlns:a16="http://schemas.microsoft.com/office/drawing/2014/main" xmlns="" val="3222670053"/>
+                    <a16:rowId xmlns="" xmlns:a16="http://schemas.microsoft.com/office/drawing/2014/main" val="3222670053"/>
                   </a:ext>
                 </a:extLst>
               </a:tr>
@@ -8354,7 +8503,7 @@
                 </a:tc>
                 <a:extLst>
                   <a:ext uri="{0D108BD9-81ED-4DB2-BD59-A6C34878D82A}">
-                    <a16:rowId xmlns:a16="http://schemas.microsoft.com/office/drawing/2014/main" xmlns="" val="1661099666"/>
+                    <a16:rowId xmlns="" xmlns:a16="http://schemas.microsoft.com/office/drawing/2014/main" val="1661099666"/>
                   </a:ext>
                 </a:extLst>
               </a:tr>
@@ -8430,7 +8579,7 @@
                 </a:tc>
                 <a:extLst>
                   <a:ext uri="{0D108BD9-81ED-4DB2-BD59-A6C34878D82A}">
-                    <a16:rowId xmlns:a16="http://schemas.microsoft.com/office/drawing/2014/main" xmlns="" val="4172047643"/>
+                    <a16:rowId xmlns="" xmlns:a16="http://schemas.microsoft.com/office/drawing/2014/main" val="4172047643"/>
                   </a:ext>
                 </a:extLst>
               </a:tr>
@@ -8506,7 +8655,7 @@
                 </a:tc>
                 <a:extLst>
                   <a:ext uri="{0D108BD9-81ED-4DB2-BD59-A6C34878D82A}">
-                    <a16:rowId xmlns:a16="http://schemas.microsoft.com/office/drawing/2014/main" xmlns="" val="1057878429"/>
+                    <a16:rowId xmlns="" xmlns:a16="http://schemas.microsoft.com/office/drawing/2014/main" val="1057878429"/>
                   </a:ext>
                 </a:extLst>
               </a:tr>
@@ -8582,7 +8731,7 @@
                 </a:tc>
                 <a:extLst>
                   <a:ext uri="{0D108BD9-81ED-4DB2-BD59-A6C34878D82A}">
-                    <a16:rowId xmlns:a16="http://schemas.microsoft.com/office/drawing/2014/main" xmlns="" val="2151953881"/>
+                    <a16:rowId xmlns="" xmlns:a16="http://schemas.microsoft.com/office/drawing/2014/main" val="2151953881"/>
                   </a:ext>
                 </a:extLst>
               </a:tr>
@@ -8658,7 +8807,7 @@
                 </a:tc>
                 <a:extLst>
                   <a:ext uri="{0D108BD9-81ED-4DB2-BD59-A6C34878D82A}">
-                    <a16:rowId xmlns:a16="http://schemas.microsoft.com/office/drawing/2014/main" xmlns="" val="3615318075"/>
+                    <a16:rowId xmlns="" xmlns:a16="http://schemas.microsoft.com/office/drawing/2014/main" val="3615318075"/>
                   </a:ext>
                 </a:extLst>
               </a:tr>
@@ -8734,7 +8883,7 @@
                 </a:tc>
                 <a:extLst>
                   <a:ext uri="{0D108BD9-81ED-4DB2-BD59-A6C34878D82A}">
-                    <a16:rowId xmlns:a16="http://schemas.microsoft.com/office/drawing/2014/main" xmlns="" val="1810581365"/>
+                    <a16:rowId xmlns="" xmlns:a16="http://schemas.microsoft.com/office/drawing/2014/main" val="1810581365"/>
                   </a:ext>
                 </a:extLst>
               </a:tr>
@@ -8810,7 +8959,7 @@
                 </a:tc>
                 <a:extLst>
                   <a:ext uri="{0D108BD9-81ED-4DB2-BD59-A6C34878D82A}">
-                    <a16:rowId xmlns:a16="http://schemas.microsoft.com/office/drawing/2014/main" xmlns="" val="240284698"/>
+                    <a16:rowId xmlns="" xmlns:a16="http://schemas.microsoft.com/office/drawing/2014/main" val="240284698"/>
                   </a:ext>
                 </a:extLst>
               </a:tr>
@@ -8886,7 +9035,7 @@
                 </a:tc>
                 <a:extLst>
                   <a:ext uri="{0D108BD9-81ED-4DB2-BD59-A6C34878D82A}">
-                    <a16:rowId xmlns:a16="http://schemas.microsoft.com/office/drawing/2014/main" xmlns="" val="2906176452"/>
+                    <a16:rowId xmlns="" xmlns:a16="http://schemas.microsoft.com/office/drawing/2014/main" val="2906176452"/>
                   </a:ext>
                 </a:extLst>
               </a:tr>
@@ -8962,7 +9111,7 @@
                 </a:tc>
                 <a:extLst>
                   <a:ext uri="{0D108BD9-81ED-4DB2-BD59-A6C34878D82A}">
-                    <a16:rowId xmlns:a16="http://schemas.microsoft.com/office/drawing/2014/main" xmlns="" val="3562986470"/>
+                    <a16:rowId xmlns="" xmlns:a16="http://schemas.microsoft.com/office/drawing/2014/main" val="3562986470"/>
                   </a:ext>
                 </a:extLst>
               </a:tr>
@@ -9038,7 +9187,7 @@
                 </a:tc>
                 <a:extLst>
                   <a:ext uri="{0D108BD9-81ED-4DB2-BD59-A6C34878D82A}">
-                    <a16:rowId xmlns:a16="http://schemas.microsoft.com/office/drawing/2014/main" xmlns="" val="1671168545"/>
+                    <a16:rowId xmlns="" xmlns:a16="http://schemas.microsoft.com/office/drawing/2014/main" val="1671168545"/>
                   </a:ext>
                 </a:extLst>
               </a:tr>
@@ -9114,7 +9263,7 @@
                 </a:tc>
                 <a:extLst>
                   <a:ext uri="{0D108BD9-81ED-4DB2-BD59-A6C34878D82A}">
-                    <a16:rowId xmlns:a16="http://schemas.microsoft.com/office/drawing/2014/main" xmlns="" val="2432487341"/>
+                    <a16:rowId xmlns="" xmlns:a16="http://schemas.microsoft.com/office/drawing/2014/main" val="2432487341"/>
                   </a:ext>
                 </a:extLst>
               </a:tr>
@@ -9190,7 +9339,7 @@
                 </a:tc>
                 <a:extLst>
                   <a:ext uri="{0D108BD9-81ED-4DB2-BD59-A6C34878D82A}">
-                    <a16:rowId xmlns:a16="http://schemas.microsoft.com/office/drawing/2014/main" xmlns="" val="823347675"/>
+                    <a16:rowId xmlns="" xmlns:a16="http://schemas.microsoft.com/office/drawing/2014/main" val="823347675"/>
                   </a:ext>
                 </a:extLst>
               </a:tr>
@@ -9266,7 +9415,7 @@
                 </a:tc>
                 <a:extLst>
                   <a:ext uri="{0D108BD9-81ED-4DB2-BD59-A6C34878D82A}">
-                    <a16:rowId xmlns:a16="http://schemas.microsoft.com/office/drawing/2014/main" xmlns="" val="3888237083"/>
+                    <a16:rowId xmlns="" xmlns:a16="http://schemas.microsoft.com/office/drawing/2014/main" val="3888237083"/>
                   </a:ext>
                 </a:extLst>
               </a:tr>
@@ -9342,7 +9491,7 @@
                 </a:tc>
                 <a:extLst>
                   <a:ext uri="{0D108BD9-81ED-4DB2-BD59-A6C34878D82A}">
-                    <a16:rowId xmlns:a16="http://schemas.microsoft.com/office/drawing/2014/main" xmlns="" val="1186328292"/>
+                    <a16:rowId xmlns="" xmlns:a16="http://schemas.microsoft.com/office/drawing/2014/main" val="1186328292"/>
                   </a:ext>
                 </a:extLst>
               </a:tr>
@@ -9436,7 +9585,7 @@
                 </a:tc>
                 <a:extLst>
                   <a:ext uri="{0D108BD9-81ED-4DB2-BD59-A6C34878D82A}">
-                    <a16:rowId xmlns:a16="http://schemas.microsoft.com/office/drawing/2014/main" xmlns="" val="4173546526"/>
+                    <a16:rowId xmlns="" xmlns:a16="http://schemas.microsoft.com/office/drawing/2014/main" val="4173546526"/>
                   </a:ext>
                 </a:extLst>
               </a:tr>
@@ -9512,7 +9661,7 @@
                 </a:tc>
                 <a:extLst>
                   <a:ext uri="{0D108BD9-81ED-4DB2-BD59-A6C34878D82A}">
-                    <a16:rowId xmlns:a16="http://schemas.microsoft.com/office/drawing/2014/main" xmlns="" val="4247627454"/>
+                    <a16:rowId xmlns="" xmlns:a16="http://schemas.microsoft.com/office/drawing/2014/main" val="4247627454"/>
                   </a:ext>
                 </a:extLst>
               </a:tr>
@@ -9588,7 +9737,7 @@
                 </a:tc>
                 <a:extLst>
                   <a:ext uri="{0D108BD9-81ED-4DB2-BD59-A6C34878D82A}">
-                    <a16:rowId xmlns:a16="http://schemas.microsoft.com/office/drawing/2014/main" xmlns="" val="2227278853"/>
+                    <a16:rowId xmlns="" xmlns:a16="http://schemas.microsoft.com/office/drawing/2014/main" val="2227278853"/>
                   </a:ext>
                 </a:extLst>
               </a:tr>
@@ -9664,7 +9813,7 @@
                 </a:tc>
                 <a:extLst>
                   <a:ext uri="{0D108BD9-81ED-4DB2-BD59-A6C34878D82A}">
-                    <a16:rowId xmlns:a16="http://schemas.microsoft.com/office/drawing/2014/main" xmlns="" val="2842433311"/>
+                    <a16:rowId xmlns="" xmlns:a16="http://schemas.microsoft.com/office/drawing/2014/main" val="2842433311"/>
                   </a:ext>
                 </a:extLst>
               </a:tr>
@@ -9696,21 +9845,21 @@
                 <a:gridCol w="3036706">
                   <a:extLst>
                     <a:ext uri="{9D8B030D-6E8A-4147-A177-3AD203B41FA5}">
-                      <a16:colId xmlns:a16="http://schemas.microsoft.com/office/drawing/2014/main" xmlns="" val="1022886225"/>
+                      <a16:colId xmlns="" xmlns:a16="http://schemas.microsoft.com/office/drawing/2014/main" val="1022886225"/>
                     </a:ext>
                   </a:extLst>
                 </a:gridCol>
                 <a:gridCol w="1181705">
                   <a:extLst>
                     <a:ext uri="{9D8B030D-6E8A-4147-A177-3AD203B41FA5}">
-                      <a16:colId xmlns:a16="http://schemas.microsoft.com/office/drawing/2014/main" xmlns="" val="2020208361"/>
+                      <a16:colId xmlns="" xmlns:a16="http://schemas.microsoft.com/office/drawing/2014/main" val="2020208361"/>
                     </a:ext>
                   </a:extLst>
                 </a:gridCol>
                 <a:gridCol w="1181705">
                   <a:extLst>
                     <a:ext uri="{9D8B030D-6E8A-4147-A177-3AD203B41FA5}">
-                      <a16:colId xmlns:a16="http://schemas.microsoft.com/office/drawing/2014/main" xmlns="" val="2629210063"/>
+                      <a16:colId xmlns="" xmlns:a16="http://schemas.microsoft.com/office/drawing/2014/main" val="2629210063"/>
                     </a:ext>
                   </a:extLst>
                 </a:gridCol>
@@ -9787,7 +9936,7 @@
                 </a:tc>
                 <a:extLst>
                   <a:ext uri="{0D108BD9-81ED-4DB2-BD59-A6C34878D82A}">
-                    <a16:rowId xmlns:a16="http://schemas.microsoft.com/office/drawing/2014/main" xmlns="" val="3352158023"/>
+                    <a16:rowId xmlns="" xmlns:a16="http://schemas.microsoft.com/office/drawing/2014/main" val="3352158023"/>
                   </a:ext>
                 </a:extLst>
               </a:tr>
@@ -9863,7 +10012,7 @@
                 </a:tc>
                 <a:extLst>
                   <a:ext uri="{0D108BD9-81ED-4DB2-BD59-A6C34878D82A}">
-                    <a16:rowId xmlns:a16="http://schemas.microsoft.com/office/drawing/2014/main" xmlns="" val="4290189252"/>
+                    <a16:rowId xmlns="" xmlns:a16="http://schemas.microsoft.com/office/drawing/2014/main" val="4290189252"/>
                   </a:ext>
                 </a:extLst>
               </a:tr>
@@ -9939,7 +10088,7 @@
                 </a:tc>
                 <a:extLst>
                   <a:ext uri="{0D108BD9-81ED-4DB2-BD59-A6C34878D82A}">
-                    <a16:rowId xmlns:a16="http://schemas.microsoft.com/office/drawing/2014/main" xmlns="" val="3727132500"/>
+                    <a16:rowId xmlns="" xmlns:a16="http://schemas.microsoft.com/office/drawing/2014/main" val="3727132500"/>
                   </a:ext>
                 </a:extLst>
               </a:tr>
@@ -10015,7 +10164,7 @@
                 </a:tc>
                 <a:extLst>
                   <a:ext uri="{0D108BD9-81ED-4DB2-BD59-A6C34878D82A}">
-                    <a16:rowId xmlns:a16="http://schemas.microsoft.com/office/drawing/2014/main" xmlns="" val="4208757681"/>
+                    <a16:rowId xmlns="" xmlns:a16="http://schemas.microsoft.com/office/drawing/2014/main" val="4208757681"/>
                   </a:ext>
                 </a:extLst>
               </a:tr>
@@ -10091,7 +10240,7 @@
                 </a:tc>
                 <a:extLst>
                   <a:ext uri="{0D108BD9-81ED-4DB2-BD59-A6C34878D82A}">
-                    <a16:rowId xmlns:a16="http://schemas.microsoft.com/office/drawing/2014/main" xmlns="" val="2929237673"/>
+                    <a16:rowId xmlns="" xmlns:a16="http://schemas.microsoft.com/office/drawing/2014/main" val="2929237673"/>
                   </a:ext>
                 </a:extLst>
               </a:tr>
@@ -10167,7 +10316,7 @@
                 </a:tc>
                 <a:extLst>
                   <a:ext uri="{0D108BD9-81ED-4DB2-BD59-A6C34878D82A}">
-                    <a16:rowId xmlns:a16="http://schemas.microsoft.com/office/drawing/2014/main" xmlns="" val="2848627066"/>
+                    <a16:rowId xmlns="" xmlns:a16="http://schemas.microsoft.com/office/drawing/2014/main" val="2848627066"/>
                   </a:ext>
                 </a:extLst>
               </a:tr>
@@ -10243,7 +10392,7 @@
                 </a:tc>
                 <a:extLst>
                   <a:ext uri="{0D108BD9-81ED-4DB2-BD59-A6C34878D82A}">
-                    <a16:rowId xmlns:a16="http://schemas.microsoft.com/office/drawing/2014/main" xmlns="" val="1011726148"/>
+                    <a16:rowId xmlns="" xmlns:a16="http://schemas.microsoft.com/office/drawing/2014/main" val="1011726148"/>
                   </a:ext>
                 </a:extLst>
               </a:tr>
@@ -10325,7 +10474,7 @@
                 </a:tc>
                 <a:extLst>
                   <a:ext uri="{0D108BD9-81ED-4DB2-BD59-A6C34878D82A}">
-                    <a16:rowId xmlns:a16="http://schemas.microsoft.com/office/drawing/2014/main" xmlns="" val="17463372"/>
+                    <a16:rowId xmlns="" xmlns:a16="http://schemas.microsoft.com/office/drawing/2014/main" val="17463372"/>
                   </a:ext>
                 </a:extLst>
               </a:tr>
@@ -10401,7 +10550,7 @@
                 </a:tc>
                 <a:extLst>
                   <a:ext uri="{0D108BD9-81ED-4DB2-BD59-A6C34878D82A}">
-                    <a16:rowId xmlns:a16="http://schemas.microsoft.com/office/drawing/2014/main" xmlns="" val="1971138859"/>
+                    <a16:rowId xmlns="" xmlns:a16="http://schemas.microsoft.com/office/drawing/2014/main" val="1971138859"/>
                   </a:ext>
                 </a:extLst>
               </a:tr>
@@ -10477,7 +10626,7 @@
                 </a:tc>
                 <a:extLst>
                   <a:ext uri="{0D108BD9-81ED-4DB2-BD59-A6C34878D82A}">
-                    <a16:rowId xmlns:a16="http://schemas.microsoft.com/office/drawing/2014/main" xmlns="" val="1508729639"/>
+                    <a16:rowId xmlns="" xmlns:a16="http://schemas.microsoft.com/office/drawing/2014/main" val="1508729639"/>
                   </a:ext>
                 </a:extLst>
               </a:tr>
@@ -10559,7 +10708,7 @@
                 </a:tc>
                 <a:extLst>
                   <a:ext uri="{0D108BD9-81ED-4DB2-BD59-A6C34878D82A}">
-                    <a16:rowId xmlns:a16="http://schemas.microsoft.com/office/drawing/2014/main" xmlns="" val="3853913370"/>
+                    <a16:rowId xmlns="" xmlns:a16="http://schemas.microsoft.com/office/drawing/2014/main" val="3853913370"/>
                   </a:ext>
                 </a:extLst>
               </a:tr>
@@ -10635,7 +10784,7 @@
                 </a:tc>
                 <a:extLst>
                   <a:ext uri="{0D108BD9-81ED-4DB2-BD59-A6C34878D82A}">
-                    <a16:rowId xmlns:a16="http://schemas.microsoft.com/office/drawing/2014/main" xmlns="" val="2386013325"/>
+                    <a16:rowId xmlns="" xmlns:a16="http://schemas.microsoft.com/office/drawing/2014/main" val="2386013325"/>
                   </a:ext>
                 </a:extLst>
               </a:tr>
@@ -10711,7 +10860,7 @@
                 </a:tc>
                 <a:extLst>
                   <a:ext uri="{0D108BD9-81ED-4DB2-BD59-A6C34878D82A}">
-                    <a16:rowId xmlns:a16="http://schemas.microsoft.com/office/drawing/2014/main" xmlns="" val="4131206225"/>
+                    <a16:rowId xmlns="" xmlns:a16="http://schemas.microsoft.com/office/drawing/2014/main" val="4131206225"/>
                   </a:ext>
                 </a:extLst>
               </a:tr>
@@ -10787,7 +10936,7 @@
                 </a:tc>
                 <a:extLst>
                   <a:ext uri="{0D108BD9-81ED-4DB2-BD59-A6C34878D82A}">
-                    <a16:rowId xmlns:a16="http://schemas.microsoft.com/office/drawing/2014/main" xmlns="" val="673049777"/>
+                    <a16:rowId xmlns="" xmlns:a16="http://schemas.microsoft.com/office/drawing/2014/main" val="673049777"/>
                   </a:ext>
                 </a:extLst>
               </a:tr>
@@ -10863,7 +11012,7 @@
                 </a:tc>
                 <a:extLst>
                   <a:ext uri="{0D108BD9-81ED-4DB2-BD59-A6C34878D82A}">
-                    <a16:rowId xmlns:a16="http://schemas.microsoft.com/office/drawing/2014/main" xmlns="" val="1698139637"/>
+                    <a16:rowId xmlns="" xmlns:a16="http://schemas.microsoft.com/office/drawing/2014/main" val="1698139637"/>
                   </a:ext>
                 </a:extLst>
               </a:tr>
@@ -10939,7 +11088,7 @@
                 </a:tc>
                 <a:extLst>
                   <a:ext uri="{0D108BD9-81ED-4DB2-BD59-A6C34878D82A}">
-                    <a16:rowId xmlns:a16="http://schemas.microsoft.com/office/drawing/2014/main" xmlns="" val="3929276156"/>
+                    <a16:rowId xmlns="" xmlns:a16="http://schemas.microsoft.com/office/drawing/2014/main" val="3929276156"/>
                   </a:ext>
                 </a:extLst>
               </a:tr>
@@ -11015,7 +11164,7 @@
                 </a:tc>
                 <a:extLst>
                   <a:ext uri="{0D108BD9-81ED-4DB2-BD59-A6C34878D82A}">
-                    <a16:rowId xmlns:a16="http://schemas.microsoft.com/office/drawing/2014/main" xmlns="" val="1881763618"/>
+                    <a16:rowId xmlns="" xmlns:a16="http://schemas.microsoft.com/office/drawing/2014/main" val="1881763618"/>
                   </a:ext>
                 </a:extLst>
               </a:tr>
@@ -11091,7 +11240,7 @@
                 </a:tc>
                 <a:extLst>
                   <a:ext uri="{0D108BD9-81ED-4DB2-BD59-A6C34878D82A}">
-                    <a16:rowId xmlns:a16="http://schemas.microsoft.com/office/drawing/2014/main" xmlns="" val="160454722"/>
+                    <a16:rowId xmlns="" xmlns:a16="http://schemas.microsoft.com/office/drawing/2014/main" val="160454722"/>
                   </a:ext>
                 </a:extLst>
               </a:tr>
@@ -11167,7 +11316,7 @@
                 </a:tc>
                 <a:extLst>
                   <a:ext uri="{0D108BD9-81ED-4DB2-BD59-A6C34878D82A}">
-                    <a16:rowId xmlns:a16="http://schemas.microsoft.com/office/drawing/2014/main" xmlns="" val="3488362082"/>
+                    <a16:rowId xmlns="" xmlns:a16="http://schemas.microsoft.com/office/drawing/2014/main" val="3488362082"/>
                   </a:ext>
                 </a:extLst>
               </a:tr>
@@ -11243,7 +11392,7 @@
                 </a:tc>
                 <a:extLst>
                   <a:ext uri="{0D108BD9-81ED-4DB2-BD59-A6C34878D82A}">
-                    <a16:rowId xmlns:a16="http://schemas.microsoft.com/office/drawing/2014/main" xmlns="" val="1840069665"/>
+                    <a16:rowId xmlns="" xmlns:a16="http://schemas.microsoft.com/office/drawing/2014/main" val="1840069665"/>
                   </a:ext>
                 </a:extLst>
               </a:tr>
@@ -11319,7 +11468,7 @@
                 </a:tc>
                 <a:extLst>
                   <a:ext uri="{0D108BD9-81ED-4DB2-BD59-A6C34878D82A}">
-                    <a16:rowId xmlns:a16="http://schemas.microsoft.com/office/drawing/2014/main" xmlns="" val="985474525"/>
+                    <a16:rowId xmlns="" xmlns:a16="http://schemas.microsoft.com/office/drawing/2014/main" val="985474525"/>
                   </a:ext>
                 </a:extLst>
               </a:tr>
@@ -11395,7 +11544,7 @@
                 </a:tc>
                 <a:extLst>
                   <a:ext uri="{0D108BD9-81ED-4DB2-BD59-A6C34878D82A}">
-                    <a16:rowId xmlns:a16="http://schemas.microsoft.com/office/drawing/2014/main" xmlns="" val="3784109591"/>
+                    <a16:rowId xmlns="" xmlns:a16="http://schemas.microsoft.com/office/drawing/2014/main" val="3784109591"/>
                   </a:ext>
                 </a:extLst>
               </a:tr>
@@ -11471,7 +11620,7 @@
                 </a:tc>
                 <a:extLst>
                   <a:ext uri="{0D108BD9-81ED-4DB2-BD59-A6C34878D82A}">
-                    <a16:rowId xmlns:a16="http://schemas.microsoft.com/office/drawing/2014/main" xmlns="" val="2131307175"/>
+                    <a16:rowId xmlns="" xmlns:a16="http://schemas.microsoft.com/office/drawing/2014/main" val="2131307175"/>
                   </a:ext>
                 </a:extLst>
               </a:tr>
@@ -11559,14 +11708,6 @@
               </a:rPr>
               <a:t>CRDW</a:t>
             </a:r>
-            <a:r>
-              <a:rPr lang="en-US" sz="3600" b="1" i="1" dirty="0" smtClean="0">
-                <a:solidFill>
-                  <a:srgbClr val="0070C0"/>
-                </a:solidFill>
-              </a:rPr>
-              <a:t/>
-            </a:r>
             <a:br>
               <a:rPr lang="en-US" sz="3600" b="1" i="1" dirty="0" smtClean="0">
                 <a:solidFill>
@@ -11628,21 +11769,21 @@
                 <a:gridCol w="3284597">
                   <a:extLst>
                     <a:ext uri="{9D8B030D-6E8A-4147-A177-3AD203B41FA5}">
-                      <a16:colId xmlns:a16="http://schemas.microsoft.com/office/drawing/2014/main" xmlns="" val="1356431335"/>
+                      <a16:colId xmlns="" xmlns:a16="http://schemas.microsoft.com/office/drawing/2014/main" val="1356431335"/>
                     </a:ext>
                   </a:extLst>
                 </a:gridCol>
                 <a:gridCol w="912804">
                   <a:extLst>
                     <a:ext uri="{9D8B030D-6E8A-4147-A177-3AD203B41FA5}">
-                      <a16:colId xmlns:a16="http://schemas.microsoft.com/office/drawing/2014/main" xmlns="" val="4074852346"/>
+                      <a16:colId xmlns="" xmlns:a16="http://schemas.microsoft.com/office/drawing/2014/main" val="4074852346"/>
                     </a:ext>
                   </a:extLst>
                 </a:gridCol>
                 <a:gridCol w="1175819">
                   <a:extLst>
                     <a:ext uri="{9D8B030D-6E8A-4147-A177-3AD203B41FA5}">
-                      <a16:colId xmlns:a16="http://schemas.microsoft.com/office/drawing/2014/main" xmlns="" val="715510892"/>
+                      <a16:colId xmlns="" xmlns:a16="http://schemas.microsoft.com/office/drawing/2014/main" val="715510892"/>
                     </a:ext>
                   </a:extLst>
                 </a:gridCol>
@@ -11719,7 +11860,7 @@
                 </a:tc>
                 <a:extLst>
                   <a:ext uri="{0D108BD9-81ED-4DB2-BD59-A6C34878D82A}">
-                    <a16:rowId xmlns:a16="http://schemas.microsoft.com/office/drawing/2014/main" xmlns="" val="1236399335"/>
+                    <a16:rowId xmlns="" xmlns:a16="http://schemas.microsoft.com/office/drawing/2014/main" val="1236399335"/>
                   </a:ext>
                 </a:extLst>
               </a:tr>
@@ -11795,7 +11936,7 @@
                 </a:tc>
                 <a:extLst>
                   <a:ext uri="{0D108BD9-81ED-4DB2-BD59-A6C34878D82A}">
-                    <a16:rowId xmlns:a16="http://schemas.microsoft.com/office/drawing/2014/main" xmlns="" val="3548785687"/>
+                    <a16:rowId xmlns="" xmlns:a16="http://schemas.microsoft.com/office/drawing/2014/main" val="3548785687"/>
                   </a:ext>
                 </a:extLst>
               </a:tr>
@@ -11893,7 +12034,7 @@
                 </a:tc>
                 <a:extLst>
                   <a:ext uri="{0D108BD9-81ED-4DB2-BD59-A6C34878D82A}">
-                    <a16:rowId xmlns:a16="http://schemas.microsoft.com/office/drawing/2014/main" xmlns="" val="949879066"/>
+                    <a16:rowId xmlns="" xmlns:a16="http://schemas.microsoft.com/office/drawing/2014/main" val="949879066"/>
                   </a:ext>
                 </a:extLst>
               </a:tr>
@@ -11991,7 +12132,7 @@
                 </a:tc>
                 <a:extLst>
                   <a:ext uri="{0D108BD9-81ED-4DB2-BD59-A6C34878D82A}">
-                    <a16:rowId xmlns:a16="http://schemas.microsoft.com/office/drawing/2014/main" xmlns="" val="3222670053"/>
+                    <a16:rowId xmlns="" xmlns:a16="http://schemas.microsoft.com/office/drawing/2014/main" val="3222670053"/>
                   </a:ext>
                 </a:extLst>
               </a:tr>
@@ -12089,7 +12230,7 @@
                 </a:tc>
                 <a:extLst>
                   <a:ext uri="{0D108BD9-81ED-4DB2-BD59-A6C34878D82A}">
-                    <a16:rowId xmlns:a16="http://schemas.microsoft.com/office/drawing/2014/main" xmlns="" val="1661099666"/>
+                    <a16:rowId xmlns="" xmlns:a16="http://schemas.microsoft.com/office/drawing/2014/main" val="1661099666"/>
                   </a:ext>
                 </a:extLst>
               </a:tr>
@@ -12187,7 +12328,7 @@
                 </a:tc>
                 <a:extLst>
                   <a:ext uri="{0D108BD9-81ED-4DB2-BD59-A6C34878D82A}">
-                    <a16:rowId xmlns:a16="http://schemas.microsoft.com/office/drawing/2014/main" xmlns="" val="4172047643"/>
+                    <a16:rowId xmlns="" xmlns:a16="http://schemas.microsoft.com/office/drawing/2014/main" val="4172047643"/>
                   </a:ext>
                 </a:extLst>
               </a:tr>
@@ -12285,7 +12426,7 @@
                 </a:tc>
                 <a:extLst>
                   <a:ext uri="{0D108BD9-81ED-4DB2-BD59-A6C34878D82A}">
-                    <a16:rowId xmlns:a16="http://schemas.microsoft.com/office/drawing/2014/main" xmlns="" val="1057878429"/>
+                    <a16:rowId xmlns="" xmlns:a16="http://schemas.microsoft.com/office/drawing/2014/main" val="1057878429"/>
                   </a:ext>
                 </a:extLst>
               </a:tr>
@@ -12383,7 +12524,7 @@
                 </a:tc>
                 <a:extLst>
                   <a:ext uri="{0D108BD9-81ED-4DB2-BD59-A6C34878D82A}">
-                    <a16:rowId xmlns:a16="http://schemas.microsoft.com/office/drawing/2014/main" xmlns="" val="2151953881"/>
+                    <a16:rowId xmlns="" xmlns:a16="http://schemas.microsoft.com/office/drawing/2014/main" val="2151953881"/>
                   </a:ext>
                 </a:extLst>
               </a:tr>
@@ -12491,7 +12632,7 @@
                 </a:tc>
                 <a:extLst>
                   <a:ext uri="{0D108BD9-81ED-4DB2-BD59-A6C34878D82A}">
-                    <a16:rowId xmlns:a16="http://schemas.microsoft.com/office/drawing/2014/main" xmlns="" val="3615318075"/>
+                    <a16:rowId xmlns="" xmlns:a16="http://schemas.microsoft.com/office/drawing/2014/main" val="3615318075"/>
                   </a:ext>
                 </a:extLst>
               </a:tr>
@@ -12619,7 +12760,7 @@
                 </a:tc>
                 <a:extLst>
                   <a:ext uri="{0D108BD9-81ED-4DB2-BD59-A6C34878D82A}">
-                    <a16:rowId xmlns:a16="http://schemas.microsoft.com/office/drawing/2014/main" xmlns="" val="1810581365"/>
+                    <a16:rowId xmlns="" xmlns:a16="http://schemas.microsoft.com/office/drawing/2014/main" val="1810581365"/>
                   </a:ext>
                 </a:extLst>
               </a:tr>
@@ -12707,7 +12848,7 @@
                 </a:tc>
                 <a:extLst>
                   <a:ext uri="{0D108BD9-81ED-4DB2-BD59-A6C34878D82A}">
-                    <a16:rowId xmlns:a16="http://schemas.microsoft.com/office/drawing/2014/main" xmlns="" val="240284698"/>
+                    <a16:rowId xmlns="" xmlns:a16="http://schemas.microsoft.com/office/drawing/2014/main" val="240284698"/>
                   </a:ext>
                 </a:extLst>
               </a:tr>
@@ -12795,7 +12936,7 @@
                 </a:tc>
                 <a:extLst>
                   <a:ext uri="{0D108BD9-81ED-4DB2-BD59-A6C34878D82A}">
-                    <a16:rowId xmlns:a16="http://schemas.microsoft.com/office/drawing/2014/main" xmlns="" val="2906176452"/>
+                    <a16:rowId xmlns="" xmlns:a16="http://schemas.microsoft.com/office/drawing/2014/main" val="2906176452"/>
                   </a:ext>
                 </a:extLst>
               </a:tr>
@@ -12893,7 +13034,7 @@
                 </a:tc>
                 <a:extLst>
                   <a:ext uri="{0D108BD9-81ED-4DB2-BD59-A6C34878D82A}">
-                    <a16:rowId xmlns:a16="http://schemas.microsoft.com/office/drawing/2014/main" xmlns="" val="3562986470"/>
+                    <a16:rowId xmlns="" xmlns:a16="http://schemas.microsoft.com/office/drawing/2014/main" val="3562986470"/>
                   </a:ext>
                 </a:extLst>
               </a:tr>
@@ -13001,7 +13142,7 @@
                 </a:tc>
                 <a:extLst>
                   <a:ext uri="{0D108BD9-81ED-4DB2-BD59-A6C34878D82A}">
-                    <a16:rowId xmlns:a16="http://schemas.microsoft.com/office/drawing/2014/main" xmlns="" val="1671168545"/>
+                    <a16:rowId xmlns="" xmlns:a16="http://schemas.microsoft.com/office/drawing/2014/main" val="1671168545"/>
                   </a:ext>
                 </a:extLst>
               </a:tr>
@@ -13099,7 +13240,7 @@
                 </a:tc>
                 <a:extLst>
                   <a:ext uri="{0D108BD9-81ED-4DB2-BD59-A6C34878D82A}">
-                    <a16:rowId xmlns:a16="http://schemas.microsoft.com/office/drawing/2014/main" xmlns="" val="2432487341"/>
+                    <a16:rowId xmlns="" xmlns:a16="http://schemas.microsoft.com/office/drawing/2014/main" val="2432487341"/>
                   </a:ext>
                 </a:extLst>
               </a:tr>
@@ -13217,7 +13358,7 @@
                 </a:tc>
                 <a:extLst>
                   <a:ext uri="{0D108BD9-81ED-4DB2-BD59-A6C34878D82A}">
-                    <a16:rowId xmlns:a16="http://schemas.microsoft.com/office/drawing/2014/main" xmlns="" val="823347675"/>
+                    <a16:rowId xmlns="" xmlns:a16="http://schemas.microsoft.com/office/drawing/2014/main" val="823347675"/>
                   </a:ext>
                 </a:extLst>
               </a:tr>
@@ -13315,7 +13456,7 @@
                 </a:tc>
                 <a:extLst>
                   <a:ext uri="{0D108BD9-81ED-4DB2-BD59-A6C34878D82A}">
-                    <a16:rowId xmlns:a16="http://schemas.microsoft.com/office/drawing/2014/main" xmlns="" val="3888237083"/>
+                    <a16:rowId xmlns="" xmlns:a16="http://schemas.microsoft.com/office/drawing/2014/main" val="3888237083"/>
                   </a:ext>
                 </a:extLst>
               </a:tr>
@@ -13403,7 +13544,7 @@
                 </a:tc>
                 <a:extLst>
                   <a:ext uri="{0D108BD9-81ED-4DB2-BD59-A6C34878D82A}">
-                    <a16:rowId xmlns:a16="http://schemas.microsoft.com/office/drawing/2014/main" xmlns="" val="1186328292"/>
+                    <a16:rowId xmlns="" xmlns:a16="http://schemas.microsoft.com/office/drawing/2014/main" val="1186328292"/>
                   </a:ext>
                 </a:extLst>
               </a:tr>
@@ -13501,7 +13642,7 @@
                 </a:tc>
                 <a:extLst>
                   <a:ext uri="{0D108BD9-81ED-4DB2-BD59-A6C34878D82A}">
-                    <a16:rowId xmlns:a16="http://schemas.microsoft.com/office/drawing/2014/main" xmlns="" val="4173546526"/>
+                    <a16:rowId xmlns="" xmlns:a16="http://schemas.microsoft.com/office/drawing/2014/main" val="4173546526"/>
                   </a:ext>
                 </a:extLst>
               </a:tr>
@@ -13601,7 +13742,7 @@
                 </a:tc>
                 <a:extLst>
                   <a:ext uri="{0D108BD9-81ED-4DB2-BD59-A6C34878D82A}">
-                    <a16:rowId xmlns:a16="http://schemas.microsoft.com/office/drawing/2014/main" xmlns="" val="4247627454"/>
+                    <a16:rowId xmlns="" xmlns:a16="http://schemas.microsoft.com/office/drawing/2014/main" val="4247627454"/>
                   </a:ext>
                 </a:extLst>
               </a:tr>
@@ -13699,7 +13840,7 @@
                 </a:tc>
                 <a:extLst>
                   <a:ext uri="{0D108BD9-81ED-4DB2-BD59-A6C34878D82A}">
-                    <a16:rowId xmlns:a16="http://schemas.microsoft.com/office/drawing/2014/main" xmlns="" val="2227278853"/>
+                    <a16:rowId xmlns="" xmlns:a16="http://schemas.microsoft.com/office/drawing/2014/main" val="2227278853"/>
                   </a:ext>
                 </a:extLst>
               </a:tr>
@@ -13797,7 +13938,7 @@
                 </a:tc>
                 <a:extLst>
                   <a:ext uri="{0D108BD9-81ED-4DB2-BD59-A6C34878D82A}">
-                    <a16:rowId xmlns:a16="http://schemas.microsoft.com/office/drawing/2014/main" xmlns="" val="2842433311"/>
+                    <a16:rowId xmlns="" xmlns:a16="http://schemas.microsoft.com/office/drawing/2014/main" val="2842433311"/>
                   </a:ext>
                 </a:extLst>
               </a:tr>
@@ -13829,21 +13970,21 @@
                 <a:gridCol w="3568779">
                   <a:extLst>
                     <a:ext uri="{9D8B030D-6E8A-4147-A177-3AD203B41FA5}">
-                      <a16:colId xmlns:a16="http://schemas.microsoft.com/office/drawing/2014/main" xmlns="" val="1356431335"/>
+                      <a16:colId xmlns="" xmlns:a16="http://schemas.microsoft.com/office/drawing/2014/main" val="1356431335"/>
                     </a:ext>
                   </a:extLst>
                 </a:gridCol>
                 <a:gridCol w="751115">
                   <a:extLst>
                     <a:ext uri="{9D8B030D-6E8A-4147-A177-3AD203B41FA5}">
-                      <a16:colId xmlns:a16="http://schemas.microsoft.com/office/drawing/2014/main" xmlns="" val="4074852346"/>
+                      <a16:colId xmlns="" xmlns:a16="http://schemas.microsoft.com/office/drawing/2014/main" val="4074852346"/>
                     </a:ext>
                   </a:extLst>
                 </a:gridCol>
                 <a:gridCol w="1053326">
                   <a:extLst>
                     <a:ext uri="{9D8B030D-6E8A-4147-A177-3AD203B41FA5}">
-                      <a16:colId xmlns:a16="http://schemas.microsoft.com/office/drawing/2014/main" xmlns="" val="715510892"/>
+                      <a16:colId xmlns="" xmlns:a16="http://schemas.microsoft.com/office/drawing/2014/main" val="715510892"/>
                     </a:ext>
                   </a:extLst>
                 </a:gridCol>
@@ -13920,7 +14061,7 @@
                 </a:tc>
                 <a:extLst>
                   <a:ext uri="{0D108BD9-81ED-4DB2-BD59-A6C34878D82A}">
-                    <a16:rowId xmlns:a16="http://schemas.microsoft.com/office/drawing/2014/main" xmlns="" val="1236399335"/>
+                    <a16:rowId xmlns="" xmlns:a16="http://schemas.microsoft.com/office/drawing/2014/main" val="1236399335"/>
                   </a:ext>
                 </a:extLst>
               </a:tr>
@@ -14008,7 +14149,7 @@
                 </a:tc>
                 <a:extLst>
                   <a:ext uri="{0D108BD9-81ED-4DB2-BD59-A6C34878D82A}">
-                    <a16:rowId xmlns:a16="http://schemas.microsoft.com/office/drawing/2014/main" xmlns="" val="3548785687"/>
+                    <a16:rowId xmlns="" xmlns:a16="http://schemas.microsoft.com/office/drawing/2014/main" val="3548785687"/>
                   </a:ext>
                 </a:extLst>
               </a:tr>
@@ -14096,7 +14237,7 @@
                 </a:tc>
                 <a:extLst>
                   <a:ext uri="{0D108BD9-81ED-4DB2-BD59-A6C34878D82A}">
-                    <a16:rowId xmlns:a16="http://schemas.microsoft.com/office/drawing/2014/main" xmlns="" val="949879066"/>
+                    <a16:rowId xmlns="" xmlns:a16="http://schemas.microsoft.com/office/drawing/2014/main" val="949879066"/>
                   </a:ext>
                 </a:extLst>
               </a:tr>
@@ -14206,7 +14347,7 @@
                 </a:tc>
                 <a:extLst>
                   <a:ext uri="{0D108BD9-81ED-4DB2-BD59-A6C34878D82A}">
-                    <a16:rowId xmlns:a16="http://schemas.microsoft.com/office/drawing/2014/main" xmlns="" val="3222670053"/>
+                    <a16:rowId xmlns="" xmlns:a16="http://schemas.microsoft.com/office/drawing/2014/main" val="3222670053"/>
                   </a:ext>
                 </a:extLst>
               </a:tr>
@@ -14314,7 +14455,7 @@
                 </a:tc>
                 <a:extLst>
                   <a:ext uri="{0D108BD9-81ED-4DB2-BD59-A6C34878D82A}">
-                    <a16:rowId xmlns:a16="http://schemas.microsoft.com/office/drawing/2014/main" xmlns="" val="1661099666"/>
+                    <a16:rowId xmlns="" xmlns:a16="http://schemas.microsoft.com/office/drawing/2014/main" val="1661099666"/>
                   </a:ext>
                 </a:extLst>
               </a:tr>
@@ -14412,7 +14553,7 @@
                 </a:tc>
                 <a:extLst>
                   <a:ext uri="{0D108BD9-81ED-4DB2-BD59-A6C34878D82A}">
-                    <a16:rowId xmlns:a16="http://schemas.microsoft.com/office/drawing/2014/main" xmlns="" val="4172047643"/>
+                    <a16:rowId xmlns="" xmlns:a16="http://schemas.microsoft.com/office/drawing/2014/main" val="4172047643"/>
                   </a:ext>
                 </a:extLst>
               </a:tr>
@@ -14510,7 +14651,7 @@
                 </a:tc>
                 <a:extLst>
                   <a:ext uri="{0D108BD9-81ED-4DB2-BD59-A6C34878D82A}">
-                    <a16:rowId xmlns:a16="http://schemas.microsoft.com/office/drawing/2014/main" xmlns="" val="1057878429"/>
+                    <a16:rowId xmlns="" xmlns:a16="http://schemas.microsoft.com/office/drawing/2014/main" val="1057878429"/>
                   </a:ext>
                 </a:extLst>
               </a:tr>
@@ -14608,7 +14749,7 @@
                 </a:tc>
                 <a:extLst>
                   <a:ext uri="{0D108BD9-81ED-4DB2-BD59-A6C34878D82A}">
-                    <a16:rowId xmlns:a16="http://schemas.microsoft.com/office/drawing/2014/main" xmlns="" val="2151953881"/>
+                    <a16:rowId xmlns="" xmlns:a16="http://schemas.microsoft.com/office/drawing/2014/main" val="2151953881"/>
                   </a:ext>
                 </a:extLst>
               </a:tr>
@@ -14700,7 +14841,7 @@
                 </a:tc>
                 <a:extLst>
                   <a:ext uri="{0D108BD9-81ED-4DB2-BD59-A6C34878D82A}">
-                    <a16:rowId xmlns:a16="http://schemas.microsoft.com/office/drawing/2014/main" xmlns="" val="3615318075"/>
+                    <a16:rowId xmlns="" xmlns:a16="http://schemas.microsoft.com/office/drawing/2014/main" val="3615318075"/>
                   </a:ext>
                 </a:extLst>
               </a:tr>
@@ -14798,7 +14939,7 @@
                 </a:tc>
                 <a:extLst>
                   <a:ext uri="{0D108BD9-81ED-4DB2-BD59-A6C34878D82A}">
-                    <a16:rowId xmlns:a16="http://schemas.microsoft.com/office/drawing/2014/main" xmlns="" val="1810581365"/>
+                    <a16:rowId xmlns="" xmlns:a16="http://schemas.microsoft.com/office/drawing/2014/main" val="1810581365"/>
                   </a:ext>
                 </a:extLst>
               </a:tr>
@@ -14890,7 +15031,7 @@
                 </a:tc>
                 <a:extLst>
                   <a:ext uri="{0D108BD9-81ED-4DB2-BD59-A6C34878D82A}">
-                    <a16:rowId xmlns:a16="http://schemas.microsoft.com/office/drawing/2014/main" xmlns="" val="240284698"/>
+                    <a16:rowId xmlns="" xmlns:a16="http://schemas.microsoft.com/office/drawing/2014/main" val="240284698"/>
                   </a:ext>
                 </a:extLst>
               </a:tr>
@@ -14988,7 +15129,7 @@
                 </a:tc>
                 <a:extLst>
                   <a:ext uri="{0D108BD9-81ED-4DB2-BD59-A6C34878D82A}">
-                    <a16:rowId xmlns:a16="http://schemas.microsoft.com/office/drawing/2014/main" xmlns="" val="2906176452"/>
+                    <a16:rowId xmlns="" xmlns:a16="http://schemas.microsoft.com/office/drawing/2014/main" val="2906176452"/>
                   </a:ext>
                 </a:extLst>
               </a:tr>
@@ -15076,7 +15217,7 @@
                 </a:tc>
                 <a:extLst>
                   <a:ext uri="{0D108BD9-81ED-4DB2-BD59-A6C34878D82A}">
-                    <a16:rowId xmlns:a16="http://schemas.microsoft.com/office/drawing/2014/main" xmlns="" val="3562986470"/>
+                    <a16:rowId xmlns="" xmlns:a16="http://schemas.microsoft.com/office/drawing/2014/main" val="3562986470"/>
                   </a:ext>
                 </a:extLst>
               </a:tr>
@@ -15176,7 +15317,7 @@
                 </a:tc>
                 <a:extLst>
                   <a:ext uri="{0D108BD9-81ED-4DB2-BD59-A6C34878D82A}">
-                    <a16:rowId xmlns:a16="http://schemas.microsoft.com/office/drawing/2014/main" xmlns="" val="1671168545"/>
+                    <a16:rowId xmlns="" xmlns:a16="http://schemas.microsoft.com/office/drawing/2014/main" val="1671168545"/>
                   </a:ext>
                 </a:extLst>
               </a:tr>
@@ -15306,7 +15447,7 @@
                 </a:tc>
                 <a:extLst>
                   <a:ext uri="{0D108BD9-81ED-4DB2-BD59-A6C34878D82A}">
-                    <a16:rowId xmlns:a16="http://schemas.microsoft.com/office/drawing/2014/main" xmlns="" val="2432487341"/>
+                    <a16:rowId xmlns="" xmlns:a16="http://schemas.microsoft.com/office/drawing/2014/main" val="2432487341"/>
                   </a:ext>
                 </a:extLst>
               </a:tr>
@@ -15448,7 +15589,7 @@
                 </a:tc>
                 <a:extLst>
                   <a:ext uri="{0D108BD9-81ED-4DB2-BD59-A6C34878D82A}">
-                    <a16:rowId xmlns:a16="http://schemas.microsoft.com/office/drawing/2014/main" xmlns="" val="823347675"/>
+                    <a16:rowId xmlns="" xmlns:a16="http://schemas.microsoft.com/office/drawing/2014/main" val="823347675"/>
                   </a:ext>
                 </a:extLst>
               </a:tr>
@@ -15554,7 +15695,7 @@
                 </a:tc>
                 <a:extLst>
                   <a:ext uri="{0D108BD9-81ED-4DB2-BD59-A6C34878D82A}">
-                    <a16:rowId xmlns:a16="http://schemas.microsoft.com/office/drawing/2014/main" xmlns="" val="3888237083"/>
+                    <a16:rowId xmlns="" xmlns:a16="http://schemas.microsoft.com/office/drawing/2014/main" val="3888237083"/>
                   </a:ext>
                 </a:extLst>
               </a:tr>
@@ -15652,7 +15793,7 @@
                 </a:tc>
                 <a:extLst>
                   <a:ext uri="{0D108BD9-81ED-4DB2-BD59-A6C34878D82A}">
-                    <a16:rowId xmlns:a16="http://schemas.microsoft.com/office/drawing/2014/main" xmlns="" val="1186328292"/>
+                    <a16:rowId xmlns="" xmlns:a16="http://schemas.microsoft.com/office/drawing/2014/main" val="1186328292"/>
                   </a:ext>
                 </a:extLst>
               </a:tr>
@@ -15740,14 +15881,6 @@
               </a:rPr>
               <a:t>CRDW</a:t>
             </a:r>
-            <a:r>
-              <a:rPr lang="en-US" sz="3600" b="1" i="1" dirty="0" smtClean="0">
-                <a:solidFill>
-                  <a:srgbClr val="0070C0"/>
-                </a:solidFill>
-              </a:rPr>
-              <a:t/>
-            </a:r>
             <a:br>
               <a:rPr lang="en-US" sz="3600" b="1" i="1" dirty="0" smtClean="0">
                 <a:solidFill>
@@ -15809,21 +15942,21 @@
                 <a:gridCol w="3333583">
                   <a:extLst>
                     <a:ext uri="{9D8B030D-6E8A-4147-A177-3AD203B41FA5}">
-                      <a16:colId xmlns:a16="http://schemas.microsoft.com/office/drawing/2014/main" xmlns="" val="1356431335"/>
+                      <a16:colId xmlns="" xmlns:a16="http://schemas.microsoft.com/office/drawing/2014/main" val="1356431335"/>
                     </a:ext>
                   </a:extLst>
                 </a:gridCol>
                 <a:gridCol w="869736">
                   <a:extLst>
                     <a:ext uri="{9D8B030D-6E8A-4147-A177-3AD203B41FA5}">
-                      <a16:colId xmlns:a16="http://schemas.microsoft.com/office/drawing/2014/main" xmlns="" val="4074852346"/>
+                      <a16:colId xmlns="" xmlns:a16="http://schemas.microsoft.com/office/drawing/2014/main" val="4074852346"/>
                     </a:ext>
                   </a:extLst>
                 </a:gridCol>
                 <a:gridCol w="1169901">
                   <a:extLst>
                     <a:ext uri="{9D8B030D-6E8A-4147-A177-3AD203B41FA5}">
-                      <a16:colId xmlns:a16="http://schemas.microsoft.com/office/drawing/2014/main" xmlns="" val="715510892"/>
+                      <a16:colId xmlns="" xmlns:a16="http://schemas.microsoft.com/office/drawing/2014/main" val="715510892"/>
                     </a:ext>
                   </a:extLst>
                 </a:gridCol>
@@ -15900,7 +16033,7 @@
                 </a:tc>
                 <a:extLst>
                   <a:ext uri="{0D108BD9-81ED-4DB2-BD59-A6C34878D82A}">
-                    <a16:rowId xmlns:a16="http://schemas.microsoft.com/office/drawing/2014/main" xmlns="" val="1236399335"/>
+                    <a16:rowId xmlns="" xmlns:a16="http://schemas.microsoft.com/office/drawing/2014/main" val="1236399335"/>
                   </a:ext>
                 </a:extLst>
               </a:tr>
@@ -15992,7 +16125,7 @@
                 </a:tc>
                 <a:extLst>
                   <a:ext uri="{0D108BD9-81ED-4DB2-BD59-A6C34878D82A}">
-                    <a16:rowId xmlns:a16="http://schemas.microsoft.com/office/drawing/2014/main" xmlns="" val="3548785687"/>
+                    <a16:rowId xmlns="" xmlns:a16="http://schemas.microsoft.com/office/drawing/2014/main" val="3548785687"/>
                   </a:ext>
                 </a:extLst>
               </a:tr>
@@ -16084,7 +16217,7 @@
                 </a:tc>
                 <a:extLst>
                   <a:ext uri="{0D108BD9-81ED-4DB2-BD59-A6C34878D82A}">
-                    <a16:rowId xmlns:a16="http://schemas.microsoft.com/office/drawing/2014/main" xmlns="" val="949879066"/>
+                    <a16:rowId xmlns="" xmlns:a16="http://schemas.microsoft.com/office/drawing/2014/main" val="949879066"/>
                   </a:ext>
                 </a:extLst>
               </a:tr>
@@ -16220,7 +16353,7 @@
                 </a:tc>
                 <a:extLst>
                   <a:ext uri="{0D108BD9-81ED-4DB2-BD59-A6C34878D82A}">
-                    <a16:rowId xmlns:a16="http://schemas.microsoft.com/office/drawing/2014/main" xmlns="" val="3222670053"/>
+                    <a16:rowId xmlns="" xmlns:a16="http://schemas.microsoft.com/office/drawing/2014/main" val="3222670053"/>
                   </a:ext>
                 </a:extLst>
               </a:tr>
@@ -16312,7 +16445,7 @@
                 </a:tc>
                 <a:extLst>
                   <a:ext uri="{0D108BD9-81ED-4DB2-BD59-A6C34878D82A}">
-                    <a16:rowId xmlns:a16="http://schemas.microsoft.com/office/drawing/2014/main" xmlns="" val="1661099666"/>
+                    <a16:rowId xmlns="" xmlns:a16="http://schemas.microsoft.com/office/drawing/2014/main" val="1661099666"/>
                   </a:ext>
                 </a:extLst>
               </a:tr>
@@ -16404,7 +16537,7 @@
                 </a:tc>
                 <a:extLst>
                   <a:ext uri="{0D108BD9-81ED-4DB2-BD59-A6C34878D82A}">
-                    <a16:rowId xmlns:a16="http://schemas.microsoft.com/office/drawing/2014/main" xmlns="" val="4172047643"/>
+                    <a16:rowId xmlns="" xmlns:a16="http://schemas.microsoft.com/office/drawing/2014/main" val="4172047643"/>
                   </a:ext>
                 </a:extLst>
               </a:tr>
@@ -16496,7 +16629,7 @@
                 </a:tc>
                 <a:extLst>
                   <a:ext uri="{0D108BD9-81ED-4DB2-BD59-A6C34878D82A}">
-                    <a16:rowId xmlns:a16="http://schemas.microsoft.com/office/drawing/2014/main" xmlns="" val="1057878429"/>
+                    <a16:rowId xmlns="" xmlns:a16="http://schemas.microsoft.com/office/drawing/2014/main" val="1057878429"/>
                   </a:ext>
                 </a:extLst>
               </a:tr>
@@ -16588,7 +16721,7 @@
                 </a:tc>
                 <a:extLst>
                   <a:ext uri="{0D108BD9-81ED-4DB2-BD59-A6C34878D82A}">
-                    <a16:rowId xmlns:a16="http://schemas.microsoft.com/office/drawing/2014/main" xmlns="" val="2151953881"/>
+                    <a16:rowId xmlns="" xmlns:a16="http://schemas.microsoft.com/office/drawing/2014/main" val="2151953881"/>
                   </a:ext>
                 </a:extLst>
               </a:tr>
@@ -16680,7 +16813,7 @@
                 </a:tc>
                 <a:extLst>
                   <a:ext uri="{0D108BD9-81ED-4DB2-BD59-A6C34878D82A}">
-                    <a16:rowId xmlns:a16="http://schemas.microsoft.com/office/drawing/2014/main" xmlns="" val="3615318075"/>
+                    <a16:rowId xmlns="" xmlns:a16="http://schemas.microsoft.com/office/drawing/2014/main" val="3615318075"/>
                   </a:ext>
                 </a:extLst>
               </a:tr>
@@ -16772,7 +16905,7 @@
                 </a:tc>
                 <a:extLst>
                   <a:ext uri="{0D108BD9-81ED-4DB2-BD59-A6C34878D82A}">
-                    <a16:rowId xmlns:a16="http://schemas.microsoft.com/office/drawing/2014/main" xmlns="" val="1810581365"/>
+                    <a16:rowId xmlns="" xmlns:a16="http://schemas.microsoft.com/office/drawing/2014/main" val="1810581365"/>
                   </a:ext>
                 </a:extLst>
               </a:tr>
@@ -16874,7 +17007,7 @@
                 </a:tc>
                 <a:extLst>
                   <a:ext uri="{0D108BD9-81ED-4DB2-BD59-A6C34878D82A}">
-                    <a16:rowId xmlns:a16="http://schemas.microsoft.com/office/drawing/2014/main" xmlns="" val="240284698"/>
+                    <a16:rowId xmlns="" xmlns:a16="http://schemas.microsoft.com/office/drawing/2014/main" val="240284698"/>
                   </a:ext>
                 </a:extLst>
               </a:tr>
@@ -16976,7 +17109,7 @@
                 </a:tc>
                 <a:extLst>
                   <a:ext uri="{0D108BD9-81ED-4DB2-BD59-A6C34878D82A}">
-                    <a16:rowId xmlns:a16="http://schemas.microsoft.com/office/drawing/2014/main" xmlns="" val="2906176452"/>
+                    <a16:rowId xmlns="" xmlns:a16="http://schemas.microsoft.com/office/drawing/2014/main" val="2906176452"/>
                   </a:ext>
                 </a:extLst>
               </a:tr>
@@ -17080,7 +17213,7 @@
                 </a:tc>
                 <a:extLst>
                   <a:ext uri="{0D108BD9-81ED-4DB2-BD59-A6C34878D82A}">
-                    <a16:rowId xmlns:a16="http://schemas.microsoft.com/office/drawing/2014/main" xmlns="" val="3562986470"/>
+                    <a16:rowId xmlns="" xmlns:a16="http://schemas.microsoft.com/office/drawing/2014/main" val="3562986470"/>
                   </a:ext>
                 </a:extLst>
               </a:tr>
@@ -17182,7 +17315,7 @@
                 </a:tc>
                 <a:extLst>
                   <a:ext uri="{0D108BD9-81ED-4DB2-BD59-A6C34878D82A}">
-                    <a16:rowId xmlns:a16="http://schemas.microsoft.com/office/drawing/2014/main" xmlns="" val="1671168545"/>
+                    <a16:rowId xmlns="" xmlns:a16="http://schemas.microsoft.com/office/drawing/2014/main" val="1671168545"/>
                   </a:ext>
                 </a:extLst>
               </a:tr>
@@ -17284,7 +17417,7 @@
                 </a:tc>
                 <a:extLst>
                   <a:ext uri="{0D108BD9-81ED-4DB2-BD59-A6C34878D82A}">
-                    <a16:rowId xmlns:a16="http://schemas.microsoft.com/office/drawing/2014/main" xmlns="" val="2432487341"/>
+                    <a16:rowId xmlns="" xmlns:a16="http://schemas.microsoft.com/office/drawing/2014/main" val="2432487341"/>
                   </a:ext>
                 </a:extLst>
               </a:tr>
@@ -17386,7 +17519,7 @@
                 </a:tc>
                 <a:extLst>
                   <a:ext uri="{0D108BD9-81ED-4DB2-BD59-A6C34878D82A}">
-                    <a16:rowId xmlns:a16="http://schemas.microsoft.com/office/drawing/2014/main" xmlns="" val="823347675"/>
+                    <a16:rowId xmlns="" xmlns:a16="http://schemas.microsoft.com/office/drawing/2014/main" val="823347675"/>
                   </a:ext>
                 </a:extLst>
               </a:tr>
@@ -17502,7 +17635,7 @@
                 </a:tc>
                 <a:extLst>
                   <a:ext uri="{0D108BD9-81ED-4DB2-BD59-A6C34878D82A}">
-                    <a16:rowId xmlns:a16="http://schemas.microsoft.com/office/drawing/2014/main" xmlns="" val="3888237083"/>
+                    <a16:rowId xmlns="" xmlns:a16="http://schemas.microsoft.com/office/drawing/2014/main" val="3888237083"/>
                   </a:ext>
                 </a:extLst>
               </a:tr>
@@ -17649,7 +17782,7 @@
                 </a:tc>
                 <a:extLst>
                   <a:ext uri="{0D108BD9-81ED-4DB2-BD59-A6C34878D82A}">
-                    <a16:rowId xmlns:a16="http://schemas.microsoft.com/office/drawing/2014/main" xmlns="" val="1186328292"/>
+                    <a16:rowId xmlns="" xmlns:a16="http://schemas.microsoft.com/office/drawing/2014/main" val="1186328292"/>
                   </a:ext>
                 </a:extLst>
               </a:tr>
@@ -17685,21 +17818,21 @@
                 <a:gridCol w="3021582">
                   <a:extLst>
                     <a:ext uri="{9D8B030D-6E8A-4147-A177-3AD203B41FA5}">
-                      <a16:colId xmlns:a16="http://schemas.microsoft.com/office/drawing/2014/main" xmlns="" val="1356431335"/>
+                      <a16:colId xmlns="" xmlns:a16="http://schemas.microsoft.com/office/drawing/2014/main" val="1356431335"/>
                     </a:ext>
                   </a:extLst>
                 </a:gridCol>
                 <a:gridCol w="1175819">
                   <a:extLst>
                     <a:ext uri="{9D8B030D-6E8A-4147-A177-3AD203B41FA5}">
-                      <a16:colId xmlns:a16="http://schemas.microsoft.com/office/drawing/2014/main" xmlns="" val="4074852346"/>
+                      <a16:colId xmlns="" xmlns:a16="http://schemas.microsoft.com/office/drawing/2014/main" val="4074852346"/>
                     </a:ext>
                   </a:extLst>
                 </a:gridCol>
                 <a:gridCol w="1175819">
                   <a:extLst>
                     <a:ext uri="{9D8B030D-6E8A-4147-A177-3AD203B41FA5}">
-                      <a16:colId xmlns:a16="http://schemas.microsoft.com/office/drawing/2014/main" xmlns="" val="715510892"/>
+                      <a16:colId xmlns="" xmlns:a16="http://schemas.microsoft.com/office/drawing/2014/main" val="715510892"/>
                     </a:ext>
                   </a:extLst>
                 </a:gridCol>
@@ -17776,7 +17909,7 @@
                 </a:tc>
                 <a:extLst>
                   <a:ext uri="{0D108BD9-81ED-4DB2-BD59-A6C34878D82A}">
-                    <a16:rowId xmlns:a16="http://schemas.microsoft.com/office/drawing/2014/main" xmlns="" val="1236399335"/>
+                    <a16:rowId xmlns="" xmlns:a16="http://schemas.microsoft.com/office/drawing/2014/main" val="1236399335"/>
                   </a:ext>
                 </a:extLst>
               </a:tr>
@@ -17868,7 +18001,7 @@
                 </a:tc>
                 <a:extLst>
                   <a:ext uri="{0D108BD9-81ED-4DB2-BD59-A6C34878D82A}">
-                    <a16:rowId xmlns:a16="http://schemas.microsoft.com/office/drawing/2014/main" xmlns="" val="3548785687"/>
+                    <a16:rowId xmlns="" xmlns:a16="http://schemas.microsoft.com/office/drawing/2014/main" val="3548785687"/>
                   </a:ext>
                 </a:extLst>
               </a:tr>
@@ -17966,7 +18099,7 @@
                 </a:tc>
                 <a:extLst>
                   <a:ext uri="{0D108BD9-81ED-4DB2-BD59-A6C34878D82A}">
-                    <a16:rowId xmlns:a16="http://schemas.microsoft.com/office/drawing/2014/main" xmlns="" val="949879066"/>
+                    <a16:rowId xmlns="" xmlns:a16="http://schemas.microsoft.com/office/drawing/2014/main" val="949879066"/>
                   </a:ext>
                 </a:extLst>
               </a:tr>
@@ -18076,7 +18209,7 @@
                 </a:tc>
                 <a:extLst>
                   <a:ext uri="{0D108BD9-81ED-4DB2-BD59-A6C34878D82A}">
-                    <a16:rowId xmlns:a16="http://schemas.microsoft.com/office/drawing/2014/main" xmlns="" val="3222670053"/>
+                    <a16:rowId xmlns="" xmlns:a16="http://schemas.microsoft.com/office/drawing/2014/main" val="3222670053"/>
                   </a:ext>
                 </a:extLst>
               </a:tr>
@@ -18186,7 +18319,7 @@
                 </a:tc>
                 <a:extLst>
                   <a:ext uri="{0D108BD9-81ED-4DB2-BD59-A6C34878D82A}">
-                    <a16:rowId xmlns:a16="http://schemas.microsoft.com/office/drawing/2014/main" xmlns="" val="1661099666"/>
+                    <a16:rowId xmlns="" xmlns:a16="http://schemas.microsoft.com/office/drawing/2014/main" val="1661099666"/>
                   </a:ext>
                 </a:extLst>
               </a:tr>
@@ -18294,7 +18427,7 @@
                 </a:tc>
                 <a:extLst>
                   <a:ext uri="{0D108BD9-81ED-4DB2-BD59-A6C34878D82A}">
-                    <a16:rowId xmlns:a16="http://schemas.microsoft.com/office/drawing/2014/main" xmlns="" val="4172047643"/>
+                    <a16:rowId xmlns="" xmlns:a16="http://schemas.microsoft.com/office/drawing/2014/main" val="4172047643"/>
                   </a:ext>
                 </a:extLst>
               </a:tr>
@@ -18402,7 +18535,7 @@
                 </a:tc>
                 <a:extLst>
                   <a:ext uri="{0D108BD9-81ED-4DB2-BD59-A6C34878D82A}">
-                    <a16:rowId xmlns:a16="http://schemas.microsoft.com/office/drawing/2014/main" xmlns="" val="1057878429"/>
+                    <a16:rowId xmlns="" xmlns:a16="http://schemas.microsoft.com/office/drawing/2014/main" val="1057878429"/>
                   </a:ext>
                 </a:extLst>
               </a:tr>
@@ -18498,7 +18631,7 @@
                 </a:tc>
                 <a:extLst>
                   <a:ext uri="{0D108BD9-81ED-4DB2-BD59-A6C34878D82A}">
-                    <a16:rowId xmlns:a16="http://schemas.microsoft.com/office/drawing/2014/main" xmlns="" val="2151953881"/>
+                    <a16:rowId xmlns="" xmlns:a16="http://schemas.microsoft.com/office/drawing/2014/main" val="2151953881"/>
                   </a:ext>
                 </a:extLst>
               </a:tr>
@@ -18594,7 +18727,7 @@
                 </a:tc>
                 <a:extLst>
                   <a:ext uri="{0D108BD9-81ED-4DB2-BD59-A6C34878D82A}">
-                    <a16:rowId xmlns:a16="http://schemas.microsoft.com/office/drawing/2014/main" xmlns="" val="3615318075"/>
+                    <a16:rowId xmlns="" xmlns:a16="http://schemas.microsoft.com/office/drawing/2014/main" val="3615318075"/>
                   </a:ext>
                 </a:extLst>
               </a:tr>
@@ -18714,7 +18847,7 @@
                 </a:tc>
                 <a:extLst>
                   <a:ext uri="{0D108BD9-81ED-4DB2-BD59-A6C34878D82A}">
-                    <a16:rowId xmlns:a16="http://schemas.microsoft.com/office/drawing/2014/main" xmlns="" val="1810581365"/>
+                    <a16:rowId xmlns="" xmlns:a16="http://schemas.microsoft.com/office/drawing/2014/main" val="1810581365"/>
                   </a:ext>
                 </a:extLst>
               </a:tr>
@@ -18822,7 +18955,7 @@
                 </a:tc>
                 <a:extLst>
                   <a:ext uri="{0D108BD9-81ED-4DB2-BD59-A6C34878D82A}">
-                    <a16:rowId xmlns:a16="http://schemas.microsoft.com/office/drawing/2014/main" xmlns="" val="240284698"/>
+                    <a16:rowId xmlns="" xmlns:a16="http://schemas.microsoft.com/office/drawing/2014/main" val="240284698"/>
                   </a:ext>
                 </a:extLst>
               </a:tr>
@@ -18914,7 +19047,7 @@
                 </a:tc>
                 <a:extLst>
                   <a:ext uri="{0D108BD9-81ED-4DB2-BD59-A6C34878D82A}">
-                    <a16:rowId xmlns:a16="http://schemas.microsoft.com/office/drawing/2014/main" xmlns="" val="2906176452"/>
+                    <a16:rowId xmlns="" xmlns:a16="http://schemas.microsoft.com/office/drawing/2014/main" val="2906176452"/>
                   </a:ext>
                 </a:extLst>
               </a:tr>
@@ -19006,7 +19139,7 @@
                 </a:tc>
                 <a:extLst>
                   <a:ext uri="{0D108BD9-81ED-4DB2-BD59-A6C34878D82A}">
-                    <a16:rowId xmlns:a16="http://schemas.microsoft.com/office/drawing/2014/main" xmlns="" val="3562986470"/>
+                    <a16:rowId xmlns="" xmlns:a16="http://schemas.microsoft.com/office/drawing/2014/main" val="3562986470"/>
                   </a:ext>
                 </a:extLst>
               </a:tr>
@@ -19100,7 +19233,7 @@
                 </a:tc>
                 <a:extLst>
                   <a:ext uri="{0D108BD9-81ED-4DB2-BD59-A6C34878D82A}">
-                    <a16:rowId xmlns:a16="http://schemas.microsoft.com/office/drawing/2014/main" xmlns="" val="1671168545"/>
+                    <a16:rowId xmlns="" xmlns:a16="http://schemas.microsoft.com/office/drawing/2014/main" val="1671168545"/>
                   </a:ext>
                 </a:extLst>
               </a:tr>
@@ -19202,7 +19335,7 @@
                 </a:tc>
                 <a:extLst>
                   <a:ext uri="{0D108BD9-81ED-4DB2-BD59-A6C34878D82A}">
-                    <a16:rowId xmlns:a16="http://schemas.microsoft.com/office/drawing/2014/main" xmlns="" val="2432487341"/>
+                    <a16:rowId xmlns="" xmlns:a16="http://schemas.microsoft.com/office/drawing/2014/main" val="2432487341"/>
                   </a:ext>
                 </a:extLst>
               </a:tr>
@@ -19397,21 +19530,21 @@
                 <a:gridCol w="3333583">
                   <a:extLst>
                     <a:ext uri="{9D8B030D-6E8A-4147-A177-3AD203B41FA5}">
-                      <a16:colId xmlns:a16="http://schemas.microsoft.com/office/drawing/2014/main" xmlns="" val="1356431335"/>
+                      <a16:colId xmlns="" xmlns:a16="http://schemas.microsoft.com/office/drawing/2014/main" val="1356431335"/>
                     </a:ext>
                   </a:extLst>
                 </a:gridCol>
                 <a:gridCol w="869736">
                   <a:extLst>
                     <a:ext uri="{9D8B030D-6E8A-4147-A177-3AD203B41FA5}">
-                      <a16:colId xmlns:a16="http://schemas.microsoft.com/office/drawing/2014/main" xmlns="" val="4074852346"/>
+                      <a16:colId xmlns="" xmlns:a16="http://schemas.microsoft.com/office/drawing/2014/main" val="4074852346"/>
                     </a:ext>
                   </a:extLst>
                 </a:gridCol>
                 <a:gridCol w="1169901">
                   <a:extLst>
                     <a:ext uri="{9D8B030D-6E8A-4147-A177-3AD203B41FA5}">
-                      <a16:colId xmlns:a16="http://schemas.microsoft.com/office/drawing/2014/main" xmlns="" val="715510892"/>
+                      <a16:colId xmlns="" xmlns:a16="http://schemas.microsoft.com/office/drawing/2014/main" val="715510892"/>
                     </a:ext>
                   </a:extLst>
                 </a:gridCol>
@@ -19488,7 +19621,7 @@
                 </a:tc>
                 <a:extLst>
                   <a:ext uri="{0D108BD9-81ED-4DB2-BD59-A6C34878D82A}">
-                    <a16:rowId xmlns:a16="http://schemas.microsoft.com/office/drawing/2014/main" xmlns="" val="1236399335"/>
+                    <a16:rowId xmlns="" xmlns:a16="http://schemas.microsoft.com/office/drawing/2014/main" val="1236399335"/>
                   </a:ext>
                 </a:extLst>
               </a:tr>
@@ -19667,7 +19800,7 @@
                 </a:tc>
                 <a:extLst>
                   <a:ext uri="{0D108BD9-81ED-4DB2-BD59-A6C34878D82A}">
-                    <a16:rowId xmlns:a16="http://schemas.microsoft.com/office/drawing/2014/main" xmlns="" val="3548785687"/>
+                    <a16:rowId xmlns="" xmlns:a16="http://schemas.microsoft.com/office/drawing/2014/main" val="3548785687"/>
                   </a:ext>
                 </a:extLst>
               </a:tr>
@@ -19771,7 +19904,7 @@
                 </a:tc>
                 <a:extLst>
                   <a:ext uri="{0D108BD9-81ED-4DB2-BD59-A6C34878D82A}">
-                    <a16:rowId xmlns:a16="http://schemas.microsoft.com/office/drawing/2014/main" xmlns="" val="949879066"/>
+                    <a16:rowId xmlns="" xmlns:a16="http://schemas.microsoft.com/office/drawing/2014/main" val="949879066"/>
                   </a:ext>
                 </a:extLst>
               </a:tr>
@@ -19885,7 +20018,7 @@
                 </a:tc>
                 <a:extLst>
                   <a:ext uri="{0D108BD9-81ED-4DB2-BD59-A6C34878D82A}">
-                    <a16:rowId xmlns:a16="http://schemas.microsoft.com/office/drawing/2014/main" xmlns="" val="3222670053"/>
+                    <a16:rowId xmlns="" xmlns:a16="http://schemas.microsoft.com/office/drawing/2014/main" val="3222670053"/>
                   </a:ext>
                 </a:extLst>
               </a:tr>
@@ -19991,7 +20124,7 @@
                 </a:tc>
                 <a:extLst>
                   <a:ext uri="{0D108BD9-81ED-4DB2-BD59-A6C34878D82A}">
-                    <a16:rowId xmlns:a16="http://schemas.microsoft.com/office/drawing/2014/main" xmlns="" val="1661099666"/>
+                    <a16:rowId xmlns="" xmlns:a16="http://schemas.microsoft.com/office/drawing/2014/main" val="1661099666"/>
                   </a:ext>
                 </a:extLst>
               </a:tr>
@@ -20097,7 +20230,7 @@
                 </a:tc>
                 <a:extLst>
                   <a:ext uri="{0D108BD9-81ED-4DB2-BD59-A6C34878D82A}">
-                    <a16:rowId xmlns:a16="http://schemas.microsoft.com/office/drawing/2014/main" xmlns="" val="4172047643"/>
+                    <a16:rowId xmlns="" xmlns:a16="http://schemas.microsoft.com/office/drawing/2014/main" val="4172047643"/>
                   </a:ext>
                 </a:extLst>
               </a:tr>
@@ -20191,7 +20324,7 @@
                 </a:tc>
                 <a:extLst>
                   <a:ext uri="{0D108BD9-81ED-4DB2-BD59-A6C34878D82A}">
-                    <a16:rowId xmlns:a16="http://schemas.microsoft.com/office/drawing/2014/main" xmlns="" val="1057878429"/>
+                    <a16:rowId xmlns="" xmlns:a16="http://schemas.microsoft.com/office/drawing/2014/main" val="1057878429"/>
                   </a:ext>
                 </a:extLst>
               </a:tr>
@@ -20283,7 +20416,7 @@
                 </a:tc>
                 <a:extLst>
                   <a:ext uri="{0D108BD9-81ED-4DB2-BD59-A6C34878D82A}">
-                    <a16:rowId xmlns:a16="http://schemas.microsoft.com/office/drawing/2014/main" xmlns="" val="2151953881"/>
+                    <a16:rowId xmlns="" xmlns:a16="http://schemas.microsoft.com/office/drawing/2014/main" val="2151953881"/>
                   </a:ext>
                 </a:extLst>
               </a:tr>
@@ -20389,7 +20522,7 @@
                 </a:tc>
                 <a:extLst>
                   <a:ext uri="{0D108BD9-81ED-4DB2-BD59-A6C34878D82A}">
-                    <a16:rowId xmlns:a16="http://schemas.microsoft.com/office/drawing/2014/main" xmlns="" val="3615318075"/>
+                    <a16:rowId xmlns="" xmlns:a16="http://schemas.microsoft.com/office/drawing/2014/main" val="3615318075"/>
                   </a:ext>
                 </a:extLst>
               </a:tr>
@@ -20493,7 +20626,7 @@
                 </a:tc>
                 <a:extLst>
                   <a:ext uri="{0D108BD9-81ED-4DB2-BD59-A6C34878D82A}">
-                    <a16:rowId xmlns:a16="http://schemas.microsoft.com/office/drawing/2014/main" xmlns="" val="1810581365"/>
+                    <a16:rowId xmlns="" xmlns:a16="http://schemas.microsoft.com/office/drawing/2014/main" val="1810581365"/>
                   </a:ext>
                 </a:extLst>
               </a:tr>
@@ -20597,7 +20730,7 @@
                 </a:tc>
                 <a:extLst>
                   <a:ext uri="{0D108BD9-81ED-4DB2-BD59-A6C34878D82A}">
-                    <a16:rowId xmlns:a16="http://schemas.microsoft.com/office/drawing/2014/main" xmlns="" val="240284698"/>
+                    <a16:rowId xmlns="" xmlns:a16="http://schemas.microsoft.com/office/drawing/2014/main" val="240284698"/>
                   </a:ext>
                 </a:extLst>
               </a:tr>
@@ -20701,7 +20834,7 @@
                 </a:tc>
                 <a:extLst>
                   <a:ext uri="{0D108BD9-81ED-4DB2-BD59-A6C34878D82A}">
-                    <a16:rowId xmlns:a16="http://schemas.microsoft.com/office/drawing/2014/main" xmlns="" val="2906176452"/>
+                    <a16:rowId xmlns="" xmlns:a16="http://schemas.microsoft.com/office/drawing/2014/main" val="2906176452"/>
                   </a:ext>
                 </a:extLst>
               </a:tr>
@@ -20827,7 +20960,7 @@
                 </a:tc>
                 <a:extLst>
                   <a:ext uri="{0D108BD9-81ED-4DB2-BD59-A6C34878D82A}">
-                    <a16:rowId xmlns:a16="http://schemas.microsoft.com/office/drawing/2014/main" xmlns="" val="3562986470"/>
+                    <a16:rowId xmlns="" xmlns:a16="http://schemas.microsoft.com/office/drawing/2014/main" val="3562986470"/>
                   </a:ext>
                 </a:extLst>
               </a:tr>
@@ -20919,7 +21052,7 @@
                 </a:tc>
                 <a:extLst>
                   <a:ext uri="{0D108BD9-81ED-4DB2-BD59-A6C34878D82A}">
-                    <a16:rowId xmlns:a16="http://schemas.microsoft.com/office/drawing/2014/main" xmlns="" val="1671168545"/>
+                    <a16:rowId xmlns="" xmlns:a16="http://schemas.microsoft.com/office/drawing/2014/main" val="1671168545"/>
                   </a:ext>
                 </a:extLst>
               </a:tr>
@@ -21194,7 +21327,70 @@
                   </a:schemeClr>
                 </a:solidFill>
               </a:rPr>
-              <a:t>(20% of projects; 10% of </a:t>
+              <a:t>(20% of projects; 10% of CRDW staff time)</a:t>
+            </a:r>
+            <a:endParaRPr lang="en-US" dirty="0">
+              <a:solidFill>
+                <a:schemeClr val="bg1">
+                  <a:lumMod val="50000"/>
+                </a:schemeClr>
+              </a:solidFill>
+            </a:endParaRPr>
+          </a:p>
+          <a:p>
+            <a:endParaRPr lang="en-US" dirty="0" smtClean="0"/>
+          </a:p>
+          <a:p>
+            <a:r>
+              <a:rPr lang="en-US" dirty="0" smtClean="0"/>
+              <a:t>Static </a:t>
+            </a:r>
+            <a:r>
+              <a:rPr lang="en-US" dirty="0"/>
+              <a:t>eligibility</a:t>
+            </a:r>
+            <a:br>
+              <a:rPr lang="en-US" dirty="0"/>
+            </a:br>
+            <a:r>
+              <a:rPr lang="en-US" dirty="0" smtClean="0">
+                <a:solidFill>
+                  <a:schemeClr val="bg1">
+                    <a:lumMod val="50000"/>
+                  </a:schemeClr>
+                </a:solidFill>
+              </a:rPr>
+              <a:t>(70% </a:t>
+            </a:r>
+            <a:r>
+              <a:rPr lang="en-US" dirty="0">
+                <a:solidFill>
+                  <a:schemeClr val="bg1">
+                    <a:lumMod val="50000"/>
+                  </a:schemeClr>
+                </a:solidFill>
+              </a:rPr>
+              <a:t>of projects; </a:t>
+            </a:r>
+            <a:r>
+              <a:rPr lang="en-US" dirty="0" smtClean="0">
+                <a:solidFill>
+                  <a:schemeClr val="bg1">
+                    <a:lumMod val="50000"/>
+                  </a:schemeClr>
+                </a:solidFill>
+              </a:rPr>
+              <a:t>20</a:t>
+            </a:r>
+            <a:r>
+              <a:rPr lang="en-US" dirty="0">
+                <a:solidFill>
+                  <a:schemeClr val="bg1">
+                    <a:lumMod val="50000"/>
+                  </a:schemeClr>
+                </a:solidFill>
+              </a:rPr>
+              <a:t>% of </a:t>
             </a:r>
             <a:r>
               <a:rPr lang="en-US" dirty="0" smtClean="0">
@@ -21207,6 +21403,39 @@
               <a:t>CRDW </a:t>
             </a:r>
             <a:r>
+              <a:rPr lang="en-US" dirty="0">
+                <a:solidFill>
+                  <a:schemeClr val="bg1">
+                    <a:lumMod val="50000"/>
+                  </a:schemeClr>
+                </a:solidFill>
+              </a:rPr>
+              <a:t>staff time)</a:t>
+            </a:r>
+          </a:p>
+          <a:p>
+            <a:pPr lvl="1"/>
+            <a:r>
+              <a:rPr lang="en-US" dirty="0"/>
+              <a:t>Virtually all projects require  identification of a patient pool</a:t>
+            </a:r>
+          </a:p>
+          <a:p>
+            <a:endParaRPr lang="en-US" dirty="0"/>
+          </a:p>
+          <a:p>
+            <a:r>
+              <a:rPr lang="en-US" dirty="0" smtClean="0"/>
+              <a:t>Rolling  eligibility</a:t>
+            </a:r>
+            <a:r>
+              <a:rPr lang="en-US" dirty="0"/>
+              <a:t/>
+            </a:r>
+            <a:br>
+              <a:rPr lang="en-US" dirty="0"/>
+            </a:br>
+            <a:r>
               <a:rPr lang="en-US" dirty="0" smtClean="0">
                 <a:solidFill>
                   <a:schemeClr val="bg1">
@@ -21214,40 +21443,7 @@
                   </a:schemeClr>
                 </a:solidFill>
               </a:rPr>
-              <a:t>staff time)</a:t>
-            </a:r>
-            <a:endParaRPr lang="en-US" dirty="0">
-              <a:solidFill>
-                <a:schemeClr val="bg1">
-                  <a:lumMod val="50000"/>
-                </a:schemeClr>
-              </a:solidFill>
-            </a:endParaRPr>
-          </a:p>
-          <a:p>
-            <a:endParaRPr lang="en-US" dirty="0" smtClean="0"/>
-          </a:p>
-          <a:p>
-            <a:r>
-              <a:rPr lang="en-US" dirty="0" smtClean="0"/>
-              <a:t>Static </a:t>
-            </a:r>
-            <a:r>
-              <a:rPr lang="en-US" dirty="0"/>
-              <a:t>eligibility</a:t>
-            </a:r>
-            <a:br>
-              <a:rPr lang="en-US" dirty="0"/>
-            </a:br>
-            <a:r>
-              <a:rPr lang="en-US" dirty="0" smtClean="0">
-                <a:solidFill>
-                  <a:schemeClr val="bg1">
-                    <a:lumMod val="50000"/>
-                  </a:schemeClr>
-                </a:solidFill>
-              </a:rPr>
-              <a:t>(70% </a:t>
+              <a:t>(30% </a:t>
             </a:r>
             <a:r>
               <a:rPr lang="en-US" dirty="0">
@@ -21267,7 +21463,7 @@
                   </a:schemeClr>
                 </a:solidFill>
               </a:rPr>
-              <a:t>20</a:t>
+              <a:t>30</a:t>
             </a:r>
             <a:r>
               <a:rPr lang="en-US" dirty="0">
@@ -21303,24 +21499,38 @@
           <a:p>
             <a:pPr lvl="1"/>
             <a:r>
-              <a:rPr lang="en-US" dirty="0"/>
-              <a:t>Virtually all projects require  identification of a patient pool</a:t>
-            </a:r>
-          </a:p>
-          <a:p>
-            <a:endParaRPr lang="en-US" dirty="0"/>
-          </a:p>
-          <a:p>
-            <a:r>
               <a:rPr lang="en-US" dirty="0" smtClean="0"/>
-              <a:t>Rolling  eligibility</a:t>
-            </a:r>
-            <a:r>
-              <a:rPr lang="en-US" dirty="0"/>
-              <a:t/>
+              <a:t>Remember study team’s assessment of eligibility as well as the participant’s response</a:t>
+            </a:r>
+          </a:p>
+          <a:p>
+            <a:pPr lvl="1"/>
+            <a:r>
+              <a:rPr lang="en-US" dirty="0" smtClean="0"/>
+              <a:t>Daily automation requires stability &amp; good logging;</a:t>
             </a:r>
             <a:br>
-              <a:rPr lang="en-US" dirty="0"/>
+              <a:rPr lang="en-US" dirty="0" smtClean="0"/>
+            </a:br>
+            <a:r>
+              <a:rPr lang="en-US" i="1" dirty="0" smtClean="0"/>
+              <a:t>e.g.</a:t>
+            </a:r>
+            <a:r>
+              <a:rPr lang="en-US" dirty="0" smtClean="0"/>
+              <a:t>, a 3 hour delay might mean zero subjects are enrolled</a:t>
+            </a:r>
+          </a:p>
+          <a:p>
+            <a:endParaRPr lang="en-US" dirty="0" smtClean="0"/>
+          </a:p>
+          <a:p>
+            <a:r>
+              <a:rPr lang="en-US" dirty="0" smtClean="0"/>
+              <a:t>Clinical outcomes for retrospective investigations</a:t>
+            </a:r>
+            <a:br>
+              <a:rPr lang="en-US" dirty="0" smtClean="0"/>
             </a:br>
             <a:r>
               <a:rPr lang="en-US" dirty="0" smtClean="0">
@@ -21330,18 +21540,20 @@
                   </a:schemeClr>
                 </a:solidFill>
               </a:rPr>
-              <a:t>(30% </a:t>
-            </a:r>
-            <a:r>
-              <a:rPr lang="en-US" dirty="0">
-                <a:solidFill>
-                  <a:schemeClr val="bg1">
-                    <a:lumMod val="50000"/>
-                  </a:schemeClr>
-                </a:solidFill>
-              </a:rPr>
-              <a:t>of projects; </a:t>
-            </a:r>
+              <a:t>(50% of projects; 30% of CRDW staff time)</a:t>
+            </a:r>
+          </a:p>
+          <a:p>
+            <a:endParaRPr lang="en-US" dirty="0" smtClean="0"/>
+          </a:p>
+          <a:p>
+            <a:r>
+              <a:rPr lang="en-US" dirty="0" smtClean="0"/>
+              <a:t>Administrative outcomes for quality improvement </a:t>
+            </a:r>
+            <a:br>
+              <a:rPr lang="en-US" dirty="0" smtClean="0"/>
+            </a:br>
             <a:r>
               <a:rPr lang="en-US" dirty="0" smtClean="0">
                 <a:solidFill>
@@ -21350,146 +21562,7 @@
                   </a:schemeClr>
                 </a:solidFill>
               </a:rPr>
-              <a:t>30</a:t>
-            </a:r>
-            <a:r>
-              <a:rPr lang="en-US" dirty="0">
-                <a:solidFill>
-                  <a:schemeClr val="bg1">
-                    <a:lumMod val="50000"/>
-                  </a:schemeClr>
-                </a:solidFill>
-              </a:rPr>
-              <a:t>% of </a:t>
-            </a:r>
-            <a:r>
-              <a:rPr lang="en-US" dirty="0" smtClean="0">
-                <a:solidFill>
-                  <a:schemeClr val="bg1">
-                    <a:lumMod val="50000"/>
-                  </a:schemeClr>
-                </a:solidFill>
-              </a:rPr>
-              <a:t>CRDW </a:t>
-            </a:r>
-            <a:r>
-              <a:rPr lang="en-US" dirty="0">
-                <a:solidFill>
-                  <a:schemeClr val="bg1">
-                    <a:lumMod val="50000"/>
-                  </a:schemeClr>
-                </a:solidFill>
-              </a:rPr>
-              <a:t>staff time)</a:t>
-            </a:r>
-          </a:p>
-          <a:p>
-            <a:pPr lvl="1"/>
-            <a:r>
-              <a:rPr lang="en-US" dirty="0" smtClean="0"/>
-              <a:t>Remember study team’s assessment of eligibility as well as the participant’s response</a:t>
-            </a:r>
-          </a:p>
-          <a:p>
-            <a:pPr lvl="1"/>
-            <a:r>
-              <a:rPr lang="en-US" dirty="0" smtClean="0"/>
-              <a:t>Daily automation requires stability &amp; good logging;</a:t>
-            </a:r>
-            <a:br>
-              <a:rPr lang="en-US" dirty="0" smtClean="0"/>
-            </a:br>
-            <a:r>
-              <a:rPr lang="en-US" i="1" dirty="0" smtClean="0"/>
-              <a:t>e.g.</a:t>
-            </a:r>
-            <a:r>
-              <a:rPr lang="en-US" dirty="0" smtClean="0"/>
-              <a:t>, a 3 hour delay might mean zero subjects are enrolled</a:t>
-            </a:r>
-          </a:p>
-          <a:p>
-            <a:endParaRPr lang="en-US" dirty="0" smtClean="0"/>
-          </a:p>
-          <a:p>
-            <a:r>
-              <a:rPr lang="en-US" dirty="0" smtClean="0"/>
-              <a:t>Clinical outcomes for retrospective investigations</a:t>
-            </a:r>
-            <a:br>
-              <a:rPr lang="en-US" dirty="0" smtClean="0"/>
-            </a:br>
-            <a:r>
-              <a:rPr lang="en-US" dirty="0" smtClean="0">
-                <a:solidFill>
-                  <a:schemeClr val="bg1">
-                    <a:lumMod val="50000"/>
-                  </a:schemeClr>
-                </a:solidFill>
-              </a:rPr>
-              <a:t>(50% of projects; 30% of </a:t>
-            </a:r>
-            <a:r>
-              <a:rPr lang="en-US" dirty="0" smtClean="0">
-                <a:solidFill>
-                  <a:schemeClr val="bg1">
-                    <a:lumMod val="50000"/>
-                  </a:schemeClr>
-                </a:solidFill>
-              </a:rPr>
-              <a:t>CRDW </a:t>
-            </a:r>
-            <a:r>
-              <a:rPr lang="en-US" dirty="0" smtClean="0">
-                <a:solidFill>
-                  <a:schemeClr val="bg1">
-                    <a:lumMod val="50000"/>
-                  </a:schemeClr>
-                </a:solidFill>
-              </a:rPr>
-              <a:t>staff time)</a:t>
-            </a:r>
-          </a:p>
-          <a:p>
-            <a:endParaRPr lang="en-US" dirty="0" smtClean="0"/>
-          </a:p>
-          <a:p>
-            <a:r>
-              <a:rPr lang="en-US" dirty="0" smtClean="0"/>
-              <a:t>Administrative outcomes for quality improvement </a:t>
-            </a:r>
-            <a:br>
-              <a:rPr lang="en-US" dirty="0" smtClean="0"/>
-            </a:br>
-            <a:r>
-              <a:rPr lang="en-US" dirty="0" smtClean="0">
-                <a:solidFill>
-                  <a:schemeClr val="bg1">
-                    <a:lumMod val="50000"/>
-                  </a:schemeClr>
-                </a:solidFill>
-              </a:rPr>
-              <a:t>(10% of projects; 2% of </a:t>
-            </a:r>
-            <a:r>
-              <a:rPr lang="en-US" dirty="0" smtClean="0">
-                <a:solidFill>
-                  <a:schemeClr val="bg1">
-                    <a:lumMod val="50000"/>
-                  </a:schemeClr>
-                </a:solidFill>
-              </a:rPr>
-              <a:t>CRDW </a:t>
-            </a:r>
-            <a:r>
-              <a:rPr lang="en-US" dirty="0" smtClean="0">
-                <a:solidFill>
-                  <a:schemeClr val="bg1">
-                    <a:lumMod val="50000"/>
-                  </a:schemeClr>
-                </a:solidFill>
-              </a:rPr>
-              <a:t>staff time)</a:t>
+              <a:t>(10% of projects; 2% of CRDW staff time)</a:t>
             </a:r>
           </a:p>
           <a:p>

</xml_diff>